<commit_message>
Fix gitignore in exercise
</commit_message>
<xml_diff>
--- a/slides/Tag-1_2-Git.pptx
+++ b/slides/Tag-1_2-Git.pptx
@@ -2334,7 +2334,7 @@
               <a:pPr algn="ctr">
                 <a:defRPr/>
               </a:pPr>
-              <a:t>09.06.2024</a:t>
+              <a:t>10.06.2024</a:t>
             </a:fld>
             <a:endParaRPr lang="de-DE" sz="1000" dirty="0">
               <a:solidFill>
@@ -4441,7 +4441,7 @@
               <a:pPr algn="ctr">
                 <a:defRPr/>
               </a:pPr>
-              <a:t>09.06.2024</a:t>
+              <a:t>10.06.2024</a:t>
             </a:fld>
             <a:endParaRPr lang="de-DE" sz="1000" dirty="0">
               <a:solidFill>
@@ -5896,7 +5896,7 @@
               <a:pPr algn="ctr">
                 <a:defRPr/>
               </a:pPr>
-              <a:t>09.06.2024</a:t>
+              <a:t>10.06.2024</a:t>
             </a:fld>
             <a:endParaRPr lang="de-DE" sz="1000">
               <a:solidFill>
@@ -20984,7 +20984,7 @@
               <a:rPr lang="de-DE" altLang="de-DE" dirty="0">
                 <a:latin typeface="Consolas" panose="020B0609020204030204" pitchFamily="49" charset="0"/>
               </a:rPr>
-              <a:t>*/</a:t>
+              <a:t>**/</a:t>
             </a:r>
             <a:r>
               <a:rPr lang="de-DE" altLang="de-DE" dirty="0" err="1">
@@ -21010,7 +21010,7 @@
               <a:rPr lang="de-DE" altLang="de-DE" dirty="0">
                 <a:latin typeface="Consolas" panose="020B0609020204030204" pitchFamily="49" charset="0"/>
               </a:rPr>
-              <a:t>*/bin/</a:t>
+              <a:t>**/bin/</a:t>
             </a:r>
           </a:p>
           <a:p>
@@ -28516,7 +28516,7 @@
             </a:r>
             <a:r>
               <a:rPr lang="de-DE" altLang="de-DE" dirty="0"/>
-              <a:t> hier leer sein.</a:t>
+              <a:t> hier leer bzw. nicht vorhanden sein.</a:t>
             </a:r>
           </a:p>
           <a:p>
@@ -31467,7 +31467,7 @@
             </a:pPr>
             <a:r>
               <a:rPr lang="de-DE" altLang="de-DE" dirty="0"/>
-              <a:t>Legen Sie im Ordner </a:t>
+              <a:t>Legen Sie erneut den Ordner </a:t>
             </a:r>
             <a:r>
               <a:rPr lang="de-DE" altLang="de-DE" dirty="0" err="1">
@@ -31479,7 +31479,7 @@
             </a:r>
             <a:r>
               <a:rPr lang="de-DE" altLang="de-DE" dirty="0"/>
-              <a:t> eine Datei </a:t>
+              <a:t>, sowie eine Datei </a:t>
             </a:r>
             <a:r>
               <a:rPr lang="de-DE" altLang="de-DE" dirty="0">
@@ -31525,7 +31525,7 @@
             </a:r>
             <a:r>
               <a:rPr lang="de-DE" altLang="de-DE" dirty="0"/>
-              <a:t> Ordner ist hier immer noch leer.</a:t>
+              <a:t> Ordner ist hier immer noch nicht vorhanden bzw. leer.</a:t>
             </a:r>
           </a:p>
           <a:p>

</xml_diff>

<commit_message>
HCO Logo im Folienmaster für normale Folien ergänzt
</commit_message>
<xml_diff>
--- a/slides/Tag-1_2-Git.pptx
+++ b/slides/Tag-1_2-Git.pptx
@@ -1818,7 +1818,7 @@
               <a:pPr algn="ctr">
                 <a:defRPr/>
               </a:pPr>
-              <a:t>10.06.2024</a:t>
+              <a:t>11.06.2024</a:t>
             </a:fld>
             <a:endParaRPr lang="de-DE" sz="1000" dirty="0">
               <a:solidFill>
@@ -2667,6 +2667,42 @@
           </a:p>
         </p:txBody>
       </p:sp>
+      <p:pic>
+        <p:nvPicPr>
+          <p:cNvPr id="3" name="Grafik 2">
+            <a:extLst>
+              <a:ext uri="{FF2B5EF4-FFF2-40B4-BE49-F238E27FC236}">
+                <a16:creationId xmlns:a16="http://schemas.microsoft.com/office/drawing/2014/main" id="{0B339388-4B4C-1300-F174-B1D6E1E2B44A}"/>
+              </a:ext>
+            </a:extLst>
+          </p:cNvPr>
+          <p:cNvPicPr>
+            <a:picLocks noChangeAspect="1"/>
+          </p:cNvPicPr>
+          <p:nvPr userDrawn="1"/>
+        </p:nvPicPr>
+        <p:blipFill>
+          <a:blip r:embed="rId7">
+            <a:extLst>
+              <a:ext uri="{28A0092B-C50C-407E-A947-70E740481C1C}">
+                <a14:useLocalDpi xmlns:a14="http://schemas.microsoft.com/office/drawing/2010/main" val="0"/>
+              </a:ext>
+            </a:extLst>
+          </a:blip>
+          <a:stretch>
+            <a:fillRect/>
+          </a:stretch>
+        </p:blipFill>
+        <p:spPr>
+          <a:xfrm>
+            <a:off x="8486775" y="-15729"/>
+            <a:ext cx="636272" cy="636272"/>
+          </a:xfrm>
+          <a:prstGeom prst="rect">
+            <a:avLst/>
+          </a:prstGeom>
+        </p:spPr>
+      </p:pic>
     </p:spTree>
   </p:cSld>
   <p:clrMap bg1="lt1" tx1="dk1" bg2="lt2" tx2="dk2" accent1="accent1" accent2="accent2" accent3="accent3" accent4="accent4" accent5="accent5" accent6="accent6" hlink="hlink" folHlink="folHlink"/>

</xml_diff>

<commit_message>
Add small changes to exercises
</commit_message>
<xml_diff>
--- a/slides/Tag-1_2-Git.pptx
+++ b/slides/Tag-1_2-Git.pptx
@@ -2346,7 +2346,7 @@
               <a:pPr algn="ctr">
                 <a:defRPr/>
               </a:pPr>
-              <a:t>12.06.2024</a:t>
+              <a:t>13.06.2024</a:t>
             </a:fld>
             <a:endParaRPr lang="de-DE" sz="1000" dirty="0">
               <a:solidFill>
@@ -4516,7 +4516,7 @@
               <a:pPr algn="ctr">
                 <a:defRPr/>
               </a:pPr>
-              <a:t>12.06.2024</a:t>
+              <a:t>13.06.2024</a:t>
             </a:fld>
             <a:endParaRPr lang="de-DE" sz="1000" dirty="0">
               <a:solidFill>
@@ -5998,7 +5998,7 @@
               <a:pPr algn="ctr">
                 <a:defRPr/>
               </a:pPr>
-              <a:t>12.06.2024</a:t>
+              <a:t>13.06.2024</a:t>
             </a:fld>
             <a:endParaRPr lang="de-DE" sz="1000">
               <a:solidFill>
@@ -8759,7 +8759,7 @@
             </a:r>
             <a:r>
               <a:rPr lang="de-DE" altLang="de-DE" dirty="0"/>
-              <a:t> lässt sich als DVCS auch ausschließlich lokal betreiben</a:t>
+              <a:t> als DVCS auch ausschließlich lokal verwendbar</a:t>
             </a:r>
           </a:p>
           <a:p>
@@ -15681,7 +15681,7 @@
               <a:rPr lang="en-US" altLang="de-DE" sz="1200" dirty="0">
                 <a:latin typeface="Consolas" panose="020B0609020204030204" pitchFamily="49" charset="0"/>
               </a:rPr>
-              <a:t>$ git commit -m "Initial commit“</a:t>
+              <a:t>$ git commit -m "Initial commit"</a:t>
             </a:r>
           </a:p>
           <a:p>
@@ -16700,7 +16700,7 @@
             </a:r>
             <a:r>
               <a:rPr lang="de-DE" altLang="de-DE" dirty="0"/>
-              <a:t> sollten nur Änderungen für das jeweilige Ziel beinhalten</a:t>
+              <a:t> sollten nur Änderungen für jeweiliges Ziel beinhalten</a:t>
             </a:r>
           </a:p>
         </p:txBody>
@@ -17399,7 +17399,7 @@
               <a:rPr lang="de-DE" altLang="de-DE" sz="1400" dirty="0">
                 <a:latin typeface="Consolas" panose="020B0609020204030204" pitchFamily="49" charset="0"/>
               </a:rPr>
-              <a:t>„</a:t>
+              <a:t>"</a:t>
             </a:r>
             <a:br>
               <a:rPr lang="de-DE" altLang="de-DE" sz="1400" dirty="0">
@@ -17799,7 +17799,7 @@
               <a:rPr lang="en-US" altLang="de-DE" sz="1400" dirty="0">
                 <a:latin typeface="Consolas" panose="020B0609020204030204" pitchFamily="49" charset="0"/>
               </a:rPr>
-              <a:t>$ git commit -m "Add content to file1“</a:t>
+              <a:t>$ git commit -m "Add content to file1"</a:t>
             </a:r>
             <a:br>
               <a:rPr lang="en-US" altLang="de-DE" sz="1400" dirty="0">
@@ -21846,7 +21846,7 @@
               <a:rPr lang="en-US" altLang="de-DE" sz="1400" dirty="0">
                 <a:latin typeface="Consolas" panose="020B0609020204030204" pitchFamily="49" charset="0"/>
               </a:rPr>
-              <a:t>$ git commit -m "Add new_file.txt file“</a:t>
+              <a:t>$ git commit -m "Add new_file.txt file"</a:t>
             </a:r>
             <a:br>
               <a:rPr lang="en-US" altLang="de-DE" sz="1400" dirty="0">
@@ -21969,7 +21969,16 @@
               <a:rPr lang="en-US" altLang="de-DE" sz="1400" dirty="0">
                 <a:latin typeface="Consolas" panose="020B0609020204030204" pitchFamily="49" charset="0"/>
               </a:rPr>
-              <a:t>        deleted:    new_file.txt</a:t>
+              <a:t>        </a:t>
+            </a:r>
+            <a:r>
+              <a:rPr lang="en-US" altLang="de-DE" sz="1400" dirty="0">
+                <a:solidFill>
+                  <a:srgbClr val="C00000"/>
+                </a:solidFill>
+                <a:latin typeface="Consolas" panose="020B0609020204030204" pitchFamily="49" charset="0"/>
+              </a:rPr>
+              <a:t>deleted:    new_file.txt</a:t>
             </a:r>
             <a:br>
               <a:rPr lang="en-US" altLang="de-DE" sz="1400" dirty="0">
@@ -22007,7 +22016,16 @@
               <a:rPr lang="en-US" altLang="de-DE" sz="1400" dirty="0">
                 <a:latin typeface="Consolas" panose="020B0609020204030204" pitchFamily="49" charset="0"/>
               </a:rPr>
-              <a:t>        file2.txt</a:t>
+              <a:t>        </a:t>
+            </a:r>
+            <a:r>
+              <a:rPr lang="en-US" altLang="de-DE" sz="1400" dirty="0">
+                <a:solidFill>
+                  <a:srgbClr val="C00000"/>
+                </a:solidFill>
+                <a:latin typeface="Consolas" panose="020B0609020204030204" pitchFamily="49" charset="0"/>
+              </a:rPr>
+              <a:t>file2.txt</a:t>
             </a:r>
             <a:br>
               <a:rPr lang="en-US" altLang="de-DE" sz="1400" dirty="0">
@@ -22461,7 +22479,7 @@
               <a:rPr lang="de-DE" altLang="de-DE" sz="1400" dirty="0">
                 <a:latin typeface="Consolas" panose="020B0609020204030204" pitchFamily="49" charset="0"/>
               </a:rPr>
-              <a:t> file2.txt„</a:t>
+              <a:t> file2.txt"</a:t>
             </a:r>
             <a:br>
               <a:rPr lang="de-DE" altLang="de-DE" sz="1400" dirty="0">
@@ -23370,6 +23388,11 @@
               </a:spcBef>
               <a:buNone/>
             </a:pPr>
+            <a:br>
+              <a:rPr lang="de-DE" altLang="de-DE" dirty="0">
+                <a:latin typeface="Consolas" panose="020B0609020204030204" pitchFamily="49" charset="0"/>
+              </a:rPr>
+            </a:br>
             <a:r>
               <a:rPr lang="de-DE" altLang="de-DE" dirty="0">
                 <a:latin typeface="Consolas" panose="020B0609020204030204" pitchFamily="49" charset="0"/>
@@ -23810,7 +23833,7 @@
             </a:r>
             <a:r>
               <a:rPr lang="de-DE" altLang="de-DE" dirty="0" err="1"/>
-              <a:t>git</a:t>
+              <a:t>Git</a:t>
             </a:r>
             <a:r>
               <a:rPr lang="de-DE" altLang="de-DE" dirty="0"/>
@@ -24552,7 +24575,7 @@
               <a:rPr lang="de-DE" altLang="de-DE" sz="1400" dirty="0">
                 <a:latin typeface="Consolas" panose="020B0609020204030204" pitchFamily="49" charset="0"/>
               </a:rPr>
-              <a:t>„</a:t>
+              <a:t>"</a:t>
             </a:r>
             <a:br>
               <a:rPr lang="de-DE" altLang="de-DE" sz="1400" dirty="0">
@@ -31237,7 +31260,7 @@
               <a:rPr lang="en-US" altLang="de-DE" sz="1200" dirty="0">
                 <a:latin typeface="Consolas" panose="020B0609020204030204" pitchFamily="49" charset="0"/>
               </a:rPr>
-              <a:t>Switched to a new branch 'feature3’</a:t>
+              <a:t>Switched to a new branch 'feature3'</a:t>
             </a:r>
           </a:p>
           <a:p>
@@ -31982,7 +32005,7 @@
               <a:rPr lang="en-US" altLang="de-DE" sz="1400" dirty="0">
                 <a:latin typeface="Consolas" panose="020B0609020204030204" pitchFamily="49" charset="0"/>
               </a:rPr>
-              <a:t>Switched to a new branch 'feature1’</a:t>
+              <a:t>Switched to a new branch 'feature1'</a:t>
             </a:r>
             <a:br>
               <a:rPr lang="en-US" altLang="de-DE" sz="1400" dirty="0">
@@ -32034,7 +32057,7 @@
               <a:rPr lang="en-US" altLang="de-DE" sz="1400" dirty="0">
                 <a:latin typeface="Consolas" panose="020B0609020204030204" pitchFamily="49" charset="0"/>
               </a:rPr>
-              <a:t>$ git commit -m "Add feature1_file1.txt“</a:t>
+              <a:t>$ git commit -m "Add feature1_file1.txt"</a:t>
             </a:r>
             <a:br>
               <a:rPr lang="en-US" altLang="de-DE" sz="1400" dirty="0">
@@ -32119,7 +32142,7 @@
               <a:rPr lang="en-US" altLang="de-DE" sz="1400" dirty="0">
                 <a:latin typeface="Consolas" panose="020B0609020204030204" pitchFamily="49" charset="0"/>
               </a:rPr>
-              <a:t>$ git commit -m "Add feature1_file2.txt“</a:t>
+              <a:t>$ git commit -m "Add feature1_file2.txt"</a:t>
             </a:r>
             <a:br>
               <a:rPr lang="en-US" altLang="de-DE" sz="1400" dirty="0">
@@ -32297,7 +32320,7 @@
               <a:rPr lang="en-US" altLang="de-DE" sz="1400" dirty="0">
                 <a:latin typeface="Consolas" panose="020B0609020204030204" pitchFamily="49" charset="0"/>
               </a:rPr>
-              <a:t>Switched to branch 'main’</a:t>
+              <a:t>Switched to branch 'main'</a:t>
             </a:r>
             <a:br>
               <a:rPr lang="en-US" altLang="de-DE" sz="1400" dirty="0">
@@ -33051,7 +33074,7 @@
               <a:rPr lang="en-US" altLang="de-DE" sz="1200" dirty="0">
                 <a:latin typeface="Consolas" panose="020B0609020204030204" pitchFamily="49" charset="0"/>
               </a:rPr>
-              <a:t>Switched to branch 'main’</a:t>
+              <a:t>Switched to branch 'main'</a:t>
             </a:r>
           </a:p>
           <a:p>
@@ -33154,7 +33177,7 @@
               <a:rPr lang="en-US" altLang="de-DE" sz="1200" dirty="0">
                 <a:latin typeface="Consolas" panose="020B0609020204030204" pitchFamily="49" charset="0"/>
               </a:rPr>
-              <a:t>Switched to branch 'feature1’</a:t>
+              <a:t>Switched to branch 'feature1'</a:t>
             </a:r>
           </a:p>
           <a:p>
@@ -33602,7 +33625,7 @@
               <a:rPr lang="en-US" altLang="de-DE" sz="1200" dirty="0">
                 <a:latin typeface="Consolas" panose="020B0609020204030204" pitchFamily="49" charset="0"/>
               </a:rPr>
-              <a:t>Switched to branch 'main’</a:t>
+              <a:t>Switched to branch 'main'</a:t>
             </a:r>
           </a:p>
           <a:p>
@@ -35091,7 +35114,7 @@
             </a:r>
             <a:r>
               <a:rPr lang="de-DE" altLang="de-DE" dirty="0"/>
-              <a:t> ausgehend vom vorletzten Commit des </a:t>
+              <a:t> ausgehend vom zweiten Commit des </a:t>
             </a:r>
             <a:r>
               <a:rPr lang="de-DE" altLang="de-DE" dirty="0" err="1">
@@ -35332,7 +35355,7 @@
               <a:rPr lang="de-DE" altLang="de-DE" sz="1400" dirty="0">
                 <a:latin typeface="Consolas" panose="020B0609020204030204" pitchFamily="49" charset="0"/>
               </a:rPr>
-              <a:t> log –</a:t>
+              <a:t> log --</a:t>
             </a:r>
             <a:r>
               <a:rPr lang="de-DE" altLang="de-DE" sz="1400" dirty="0" err="1">
@@ -35493,7 +35516,7 @@
               <a:rPr lang="de-DE" altLang="de-DE" sz="1400" dirty="0">
                 <a:latin typeface="Consolas" panose="020B0609020204030204" pitchFamily="49" charset="0"/>
               </a:rPr>
-              <a:t>86561fb</a:t>
+              <a:t>1092ab2</a:t>
             </a:r>
             <a:br>
               <a:rPr lang="en-US" altLang="de-DE" sz="1400" dirty="0">
@@ -35504,7 +35527,7 @@
               <a:rPr lang="en-US" altLang="de-DE" sz="1400" dirty="0">
                 <a:latin typeface="Consolas" panose="020B0609020204030204" pitchFamily="49" charset="0"/>
               </a:rPr>
-              <a:t>Switched to a new branch 'feature2’</a:t>
+              <a:t>Switched to a new branch 'feature2'</a:t>
             </a:r>
             <a:br>
               <a:rPr lang="en-US" altLang="de-DE" sz="1400" dirty="0">
@@ -35590,7 +35613,7 @@
               <a:rPr lang="en-US" altLang="de-DE" sz="1400" dirty="0">
                 <a:latin typeface="Consolas" panose="020B0609020204030204" pitchFamily="49" charset="0"/>
               </a:rPr>
-              <a:t>$ git commit -m "Add feature2_file1.txt“</a:t>
+              <a:t>$ git commit -m "Add feature2_file1.txt"</a:t>
             </a:r>
             <a:br>
               <a:rPr lang="en-US" altLang="de-DE" sz="1400" dirty="0">
@@ -35782,7 +35805,7 @@
               <a:rPr lang="en-US" altLang="de-DE" sz="1400" dirty="0">
                 <a:latin typeface="Consolas" panose="020B0609020204030204" pitchFamily="49" charset="0"/>
               </a:rPr>
-              <a:t>Switched to branch 'main’</a:t>
+              <a:t>Switched to branch 'main'</a:t>
             </a:r>
             <a:br>
               <a:rPr lang="en-US" altLang="de-DE" sz="1400" dirty="0">

</xml_diff>

<commit_message>
Fix minor faults in 1_2, 1_3 and 1_5
</commit_message>
<xml_diff>
--- a/slides/Tag-1_2-Git.pptx
+++ b/slides/Tag-1_2-Git.pptx
@@ -17225,101 +17225,8 @@
               </a:rPr>
               <a:t> file1.txt</a:t>
             </a:r>
-          </a:p>
-          <a:p>
-            <a:pPr marL="457200" indent="-457200">
-              <a:buFont typeface="+mj-lt"/>
-              <a:buAutoNum type="arabicPeriod"/>
-            </a:pPr>
-            <a:r>
-              <a:rPr lang="en-US" altLang="de-DE" sz="1400" dirty="0">
-                <a:latin typeface="Consolas" panose="020B0609020204030204" pitchFamily="49" charset="0"/>
-              </a:rPr>
-              <a:t>$ git status</a:t>
-            </a:r>
             <a:br>
-              <a:rPr lang="en-US" altLang="de-DE" sz="1400" dirty="0">
-                <a:latin typeface="Consolas" panose="020B0609020204030204" pitchFamily="49" charset="0"/>
-              </a:rPr>
-            </a:br>
-            <a:r>
-              <a:rPr lang="en-US" altLang="de-DE" sz="1400" dirty="0">
-                <a:latin typeface="Consolas" panose="020B0609020204030204" pitchFamily="49" charset="0"/>
-              </a:rPr>
-              <a:t>On branch main</a:t>
-            </a:r>
-            <a:br>
-              <a:rPr lang="en-US" altLang="de-DE" sz="1400" dirty="0">
-                <a:latin typeface="Consolas" panose="020B0609020204030204" pitchFamily="49" charset="0"/>
-              </a:rPr>
-            </a:br>
-            <a:br>
-              <a:rPr lang="en-US" altLang="de-DE" sz="1400" dirty="0">
-                <a:latin typeface="Consolas" panose="020B0609020204030204" pitchFamily="49" charset="0"/>
-              </a:rPr>
-            </a:br>
-            <a:r>
-              <a:rPr lang="en-US" altLang="de-DE" sz="1400" dirty="0">
-                <a:latin typeface="Consolas" panose="020B0609020204030204" pitchFamily="49" charset="0"/>
-              </a:rPr>
-              <a:t>No commits yet</a:t>
-            </a:r>
-            <a:br>
-              <a:rPr lang="en-US" altLang="de-DE" sz="1400" dirty="0">
-                <a:latin typeface="Consolas" panose="020B0609020204030204" pitchFamily="49" charset="0"/>
-              </a:rPr>
-            </a:br>
-            <a:br>
-              <a:rPr lang="en-US" altLang="de-DE" sz="1400" dirty="0">
-                <a:latin typeface="Consolas" panose="020B0609020204030204" pitchFamily="49" charset="0"/>
-              </a:rPr>
-            </a:br>
-            <a:r>
-              <a:rPr lang="en-US" altLang="de-DE" sz="1400" dirty="0">
-                <a:latin typeface="Consolas" panose="020B0609020204030204" pitchFamily="49" charset="0"/>
-              </a:rPr>
-              <a:t>Untracked files:</a:t>
-            </a:r>
-            <a:br>
-              <a:rPr lang="en-US" altLang="de-DE" sz="1400" dirty="0">
-                <a:latin typeface="Consolas" panose="020B0609020204030204" pitchFamily="49" charset="0"/>
-              </a:rPr>
-            </a:br>
-            <a:r>
-              <a:rPr lang="en-US" altLang="de-DE" sz="1400" dirty="0">
-                <a:latin typeface="Consolas" panose="020B0609020204030204" pitchFamily="49" charset="0"/>
-              </a:rPr>
-              <a:t>  (use "git add &lt;file&gt;..." to include in what will be committed) </a:t>
-            </a:r>
-            <a:br>
-              <a:rPr lang="en-US" altLang="de-DE" sz="1400" dirty="0">
-                <a:latin typeface="Consolas" panose="020B0609020204030204" pitchFamily="49" charset="0"/>
-              </a:rPr>
-            </a:br>
-            <a:r>
-              <a:rPr lang="en-US" altLang="de-DE" sz="1400" dirty="0">
-                <a:latin typeface="Consolas" panose="020B0609020204030204" pitchFamily="49" charset="0"/>
-              </a:rPr>
-              <a:t>       file1.txt</a:t>
-            </a:r>
-            <a:br>
-              <a:rPr lang="en-US" altLang="de-DE" sz="1400" dirty="0">
-                <a:latin typeface="Consolas" panose="020B0609020204030204" pitchFamily="49" charset="0"/>
-              </a:rPr>
-            </a:br>
-            <a:br>
-              <a:rPr lang="en-US" altLang="de-DE" sz="1400" dirty="0">
-                <a:latin typeface="Consolas" panose="020B0609020204030204" pitchFamily="49" charset="0"/>
-              </a:rPr>
-            </a:br>
-            <a:r>
-              <a:rPr lang="en-US" altLang="de-DE" sz="1400" dirty="0">
-                <a:latin typeface="Consolas" panose="020B0609020204030204" pitchFamily="49" charset="0"/>
-              </a:rPr>
-              <a:t>nothing added to commit but untracked files present (use "git add" to track)</a:t>
-            </a:r>
-            <a:br>
-              <a:rPr lang="en-US" altLang="de-DE" sz="1400" dirty="0">
+              <a:rPr lang="de-DE" altLang="de-DE" sz="1400" dirty="0">
                 <a:latin typeface="Consolas" panose="020B0609020204030204" pitchFamily="49" charset="0"/>
               </a:rPr>
             </a:br>
@@ -17333,6 +17240,107 @@
               <a:buAutoNum type="arabicPeriod"/>
             </a:pPr>
             <a:r>
+              <a:rPr lang="en-US" altLang="de-DE" sz="1400" dirty="0">
+                <a:latin typeface="Consolas" panose="020B0609020204030204" pitchFamily="49" charset="0"/>
+              </a:rPr>
+              <a:t>$ git status</a:t>
+            </a:r>
+            <a:br>
+              <a:rPr lang="en-US" altLang="de-DE" sz="1400" dirty="0">
+                <a:latin typeface="Consolas" panose="020B0609020204030204" pitchFamily="49" charset="0"/>
+              </a:rPr>
+            </a:br>
+            <a:r>
+              <a:rPr lang="en-US" altLang="de-DE" sz="1400" dirty="0">
+                <a:latin typeface="Consolas" panose="020B0609020204030204" pitchFamily="49" charset="0"/>
+              </a:rPr>
+              <a:t>On branch main</a:t>
+            </a:r>
+            <a:br>
+              <a:rPr lang="en-US" altLang="de-DE" sz="1400" dirty="0">
+                <a:latin typeface="Consolas" panose="020B0609020204030204" pitchFamily="49" charset="0"/>
+              </a:rPr>
+            </a:br>
+            <a:br>
+              <a:rPr lang="en-US" altLang="de-DE" sz="1400" dirty="0">
+                <a:latin typeface="Consolas" panose="020B0609020204030204" pitchFamily="49" charset="0"/>
+              </a:rPr>
+            </a:br>
+            <a:r>
+              <a:rPr lang="en-US" altLang="de-DE" sz="1400" dirty="0">
+                <a:latin typeface="Consolas" panose="020B0609020204030204" pitchFamily="49" charset="0"/>
+              </a:rPr>
+              <a:t>No commits yet</a:t>
+            </a:r>
+            <a:br>
+              <a:rPr lang="en-US" altLang="de-DE" sz="1400" dirty="0">
+                <a:latin typeface="Consolas" panose="020B0609020204030204" pitchFamily="49" charset="0"/>
+              </a:rPr>
+            </a:br>
+            <a:br>
+              <a:rPr lang="en-US" altLang="de-DE" sz="1400" dirty="0">
+                <a:latin typeface="Consolas" panose="020B0609020204030204" pitchFamily="49" charset="0"/>
+              </a:rPr>
+            </a:br>
+            <a:r>
+              <a:rPr lang="en-US" altLang="de-DE" sz="1400" dirty="0">
+                <a:latin typeface="Consolas" panose="020B0609020204030204" pitchFamily="49" charset="0"/>
+              </a:rPr>
+              <a:t>Untracked files:</a:t>
+            </a:r>
+            <a:br>
+              <a:rPr lang="en-US" altLang="de-DE" sz="1400" dirty="0">
+                <a:latin typeface="Consolas" panose="020B0609020204030204" pitchFamily="49" charset="0"/>
+              </a:rPr>
+            </a:br>
+            <a:r>
+              <a:rPr lang="en-US" altLang="de-DE" sz="1400" dirty="0">
+                <a:latin typeface="Consolas" panose="020B0609020204030204" pitchFamily="49" charset="0"/>
+              </a:rPr>
+              <a:t>  (use "git add &lt;file&gt;..." to include in what will be committed) </a:t>
+            </a:r>
+            <a:br>
+              <a:rPr lang="en-US" altLang="de-DE" sz="1400" dirty="0">
+                <a:latin typeface="Consolas" panose="020B0609020204030204" pitchFamily="49" charset="0"/>
+              </a:rPr>
+            </a:br>
+            <a:r>
+              <a:rPr lang="en-US" altLang="de-DE" sz="1400" dirty="0">
+                <a:latin typeface="Consolas" panose="020B0609020204030204" pitchFamily="49" charset="0"/>
+              </a:rPr>
+              <a:t>       file1.txt</a:t>
+            </a:r>
+            <a:br>
+              <a:rPr lang="en-US" altLang="de-DE" sz="1400" dirty="0">
+                <a:latin typeface="Consolas" panose="020B0609020204030204" pitchFamily="49" charset="0"/>
+              </a:rPr>
+            </a:br>
+            <a:br>
+              <a:rPr lang="en-US" altLang="de-DE" sz="1400" dirty="0">
+                <a:latin typeface="Consolas" panose="020B0609020204030204" pitchFamily="49" charset="0"/>
+              </a:rPr>
+            </a:br>
+            <a:r>
+              <a:rPr lang="en-US" altLang="de-DE" sz="1400" dirty="0">
+                <a:latin typeface="Consolas" panose="020B0609020204030204" pitchFamily="49" charset="0"/>
+              </a:rPr>
+              <a:t>nothing added to commit but untracked files present (use "git add" to track)</a:t>
+            </a:r>
+            <a:br>
+              <a:rPr lang="en-US" altLang="de-DE" sz="1400" dirty="0">
+                <a:latin typeface="Consolas" panose="020B0609020204030204" pitchFamily="49" charset="0"/>
+              </a:rPr>
+            </a:br>
+            <a:endParaRPr lang="de-DE" altLang="de-DE" sz="1400" dirty="0">
+              <a:latin typeface="Consolas" panose="020B0609020204030204" pitchFamily="49" charset="0"/>
+            </a:endParaRPr>
+          </a:p>
+          <a:p>
+            <a:pPr marL="457200" indent="-457200">
+              <a:buFont typeface="+mj-lt"/>
+              <a:buAutoNum type="arabicPeriod"/>
+            </a:pPr>
+            <a:r>
               <a:rPr lang="de-DE" altLang="de-DE" sz="1400" dirty="0">
                 <a:latin typeface="Consolas" panose="020B0609020204030204" pitchFamily="49" charset="0"/>
               </a:rPr>
@@ -17362,6 +17370,11 @@
               </a:rPr>
               <a:t> file1.txt</a:t>
             </a:r>
+            <a:br>
+              <a:rPr lang="de-DE" altLang="de-DE" sz="1400" dirty="0">
+                <a:latin typeface="Consolas" panose="020B0609020204030204" pitchFamily="49" charset="0"/>
+              </a:rPr>
+            </a:br>
             <a:br>
               <a:rPr lang="de-DE" altLang="de-DE" sz="1400" dirty="0">
                 <a:latin typeface="Consolas" panose="020B0609020204030204" pitchFamily="49" charset="0"/>

</xml_diff>

<commit_message>
Reduzierung Text tag 1
</commit_message>
<xml_diff>
--- a/slides/Tag-1_2-Git.pptx
+++ b/slides/Tag-1_2-Git.pptx
@@ -1311,6 +1311,494 @@
 </p:notes>
 </file>
 
+<file path=ppt/notesSlides/notesSlide2.xml><?xml version="1.0" encoding="utf-8"?>
+<p:notes xmlns:a="http://schemas.openxmlformats.org/drawingml/2006/main" xmlns:r="http://schemas.openxmlformats.org/officeDocument/2006/relationships" xmlns:p="http://schemas.openxmlformats.org/presentationml/2006/main">
+  <p:cSld>
+    <p:spTree>
+      <p:nvGrpSpPr>
+        <p:cNvPr id="1" name=""/>
+        <p:cNvGrpSpPr/>
+        <p:nvPr/>
+      </p:nvGrpSpPr>
+      <p:grpSpPr>
+        <a:xfrm>
+          <a:off x="0" y="0"/>
+          <a:ext cx="0" cy="0"/>
+          <a:chOff x="0" y="0"/>
+          <a:chExt cx="0" cy="0"/>
+        </a:xfrm>
+      </p:grpSpPr>
+      <p:sp>
+        <p:nvSpPr>
+          <p:cNvPr id="2" name="Folienbildplatzhalter 1"/>
+          <p:cNvSpPr>
+            <a:spLocks noGrp="1" noRot="1" noChangeAspect="1"/>
+          </p:cNvSpPr>
+          <p:nvPr>
+            <p:ph type="sldImg"/>
+          </p:nvPr>
+        </p:nvSpPr>
+        <p:spPr/>
+      </p:sp>
+      <p:sp>
+        <p:nvSpPr>
+          <p:cNvPr id="3" name="Notizenplatzhalter 2"/>
+          <p:cNvSpPr>
+            <a:spLocks noGrp="1"/>
+          </p:cNvSpPr>
+          <p:nvPr>
+            <p:ph type="body" idx="1"/>
+          </p:nvPr>
+        </p:nvSpPr>
+        <p:spPr/>
+        <p:txBody>
+          <a:bodyPr/>
+          <a:lstStyle/>
+          <a:p>
+            <a:r>
+              <a:rPr lang="de-DE" altLang="de-DE" dirty="0"/>
+              <a:t>Konfigurationsdateien können auf drei Ebenen gespeichert werden</a:t>
+            </a:r>
+          </a:p>
+          <a:p>
+            <a:pPr lvl="1"/>
+            <a:r>
+              <a:rPr lang="de-DE" altLang="de-DE" b="1" dirty="0"/>
+              <a:t>Systemkonfiguration</a:t>
+            </a:r>
+          </a:p>
+          <a:p>
+            <a:pPr lvl="2"/>
+            <a:r>
+              <a:rPr lang="de-DE" altLang="de-DE" dirty="0"/>
+              <a:t>/</a:t>
+            </a:r>
+            <a:r>
+              <a:rPr lang="de-DE" altLang="de-DE" dirty="0" err="1"/>
+              <a:t>etc</a:t>
+            </a:r>
+            <a:r>
+              <a:rPr lang="de-DE" altLang="de-DE" dirty="0"/>
+              <a:t>/</a:t>
+            </a:r>
+            <a:r>
+              <a:rPr lang="de-DE" altLang="de-DE" dirty="0" err="1"/>
+              <a:t>gitconfig</a:t>
+            </a:r>
+            <a:r>
+              <a:rPr lang="de-DE" altLang="de-DE" dirty="0"/>
+              <a:t> (Linux)</a:t>
+            </a:r>
+          </a:p>
+          <a:p>
+            <a:pPr lvl="2"/>
+            <a:r>
+              <a:rPr lang="de-DE" altLang="de-DE" dirty="0"/>
+              <a:t>C:\ProgrammData\Git\config oder C:\Programm Files\</a:t>
+            </a:r>
+            <a:r>
+              <a:rPr lang="de-DE" altLang="de-DE" dirty="0" err="1"/>
+              <a:t>Git</a:t>
+            </a:r>
+            <a:r>
+              <a:rPr lang="de-DE" altLang="de-DE" dirty="0"/>
+              <a:t>\</a:t>
+            </a:r>
+            <a:r>
+              <a:rPr lang="de-DE" altLang="de-DE" dirty="0" err="1"/>
+              <a:t>etc</a:t>
+            </a:r>
+            <a:r>
+              <a:rPr lang="de-DE" altLang="de-DE" dirty="0"/>
+              <a:t>\</a:t>
+            </a:r>
+            <a:r>
+              <a:rPr lang="de-DE" altLang="de-DE" dirty="0" err="1"/>
+              <a:t>gitconfig</a:t>
+            </a:r>
+            <a:r>
+              <a:rPr lang="de-DE" altLang="de-DE" dirty="0"/>
+              <a:t> (Windows, </a:t>
+            </a:r>
+            <a:r>
+              <a:rPr lang="de-DE" altLang="de-DE" dirty="0" err="1"/>
+              <a:t>Git</a:t>
+            </a:r>
+            <a:r>
+              <a:rPr lang="de-DE" altLang="de-DE" dirty="0"/>
+              <a:t> Version 2.x oder neuer)</a:t>
+            </a:r>
+          </a:p>
+          <a:p>
+            <a:pPr lvl="1"/>
+            <a:r>
+              <a:rPr lang="de-DE" altLang="de-DE" b="1" dirty="0"/>
+              <a:t>Userkonfiguration</a:t>
+            </a:r>
+          </a:p>
+          <a:p>
+            <a:pPr lvl="2"/>
+            <a:r>
+              <a:rPr lang="de-DE" altLang="de-DE" dirty="0"/>
+              <a:t>~/.</a:t>
+            </a:r>
+            <a:r>
+              <a:rPr lang="de-DE" altLang="de-DE" dirty="0" err="1"/>
+              <a:t>gitconfig</a:t>
+            </a:r>
+            <a:r>
+              <a:rPr lang="de-DE" altLang="de-DE" dirty="0"/>
+              <a:t> oder ~/.</a:t>
+            </a:r>
+            <a:r>
+              <a:rPr lang="de-DE" altLang="de-DE" dirty="0" err="1"/>
+              <a:t>config</a:t>
+            </a:r>
+            <a:r>
+              <a:rPr lang="de-DE" altLang="de-DE" dirty="0"/>
+              <a:t>/</a:t>
+            </a:r>
+            <a:r>
+              <a:rPr lang="de-DE" altLang="de-DE" dirty="0" err="1"/>
+              <a:t>gitconfig</a:t>
+            </a:r>
+            <a:r>
+              <a:rPr lang="de-DE" altLang="de-DE" dirty="0"/>
+              <a:t> (Linux)</a:t>
+            </a:r>
+          </a:p>
+          <a:p>
+            <a:pPr lvl="2"/>
+            <a:r>
+              <a:rPr lang="de-DE" altLang="de-DE" dirty="0"/>
+              <a:t>C:\User\&lt;User&gt;\.gitconfig (Windows)</a:t>
+            </a:r>
+          </a:p>
+          <a:p>
+            <a:pPr lvl="1"/>
+            <a:r>
+              <a:rPr lang="de-DE" altLang="de-DE" b="1" dirty="0"/>
+              <a:t>Projektkonfiguration</a:t>
+            </a:r>
+          </a:p>
+          <a:p>
+            <a:pPr lvl="2"/>
+            <a:r>
+              <a:rPr lang="de-DE" altLang="de-DE" dirty="0"/>
+              <a:t>&lt;Pfad zum Projekt&gt;/.</a:t>
+            </a:r>
+            <a:r>
+              <a:rPr lang="de-DE" altLang="de-DE" dirty="0" err="1"/>
+              <a:t>git</a:t>
+            </a:r>
+            <a:r>
+              <a:rPr lang="de-DE" altLang="de-DE" dirty="0"/>
+              <a:t>/</a:t>
+            </a:r>
+            <a:r>
+              <a:rPr lang="de-DE" altLang="de-DE" dirty="0" err="1"/>
+              <a:t>config</a:t>
+            </a:r>
+            <a:endParaRPr lang="de-DE" altLang="de-DE" dirty="0"/>
+          </a:p>
+          <a:p>
+            <a:endParaRPr lang="de-DE" dirty="0"/>
+          </a:p>
+        </p:txBody>
+      </p:sp>
+      <p:sp>
+        <p:nvSpPr>
+          <p:cNvPr id="4" name="Foliennummernplatzhalter 3"/>
+          <p:cNvSpPr>
+            <a:spLocks noGrp="1"/>
+          </p:cNvSpPr>
+          <p:nvPr>
+            <p:ph type="sldNum" sz="quarter" idx="5"/>
+          </p:nvPr>
+        </p:nvSpPr>
+        <p:spPr/>
+        <p:txBody>
+          <a:bodyPr/>
+          <a:lstStyle/>
+          <a:p>
+            <a:fld id="{18182567-388C-4D33-8B7B-A651F195F118}" type="slidenum">
+              <a:rPr lang="de-DE" altLang="de-DE" smtClean="0"/>
+              <a:pPr/>
+              <a:t>18</a:t>
+            </a:fld>
+            <a:endParaRPr lang="de-DE" altLang="de-DE"/>
+          </a:p>
+        </p:txBody>
+      </p:sp>
+    </p:spTree>
+    <p:extLst>
+      <p:ext uri="{BB962C8B-B14F-4D97-AF65-F5344CB8AC3E}">
+        <p14:creationId xmlns:p14="http://schemas.microsoft.com/office/powerpoint/2010/main" val="3890333188"/>
+      </p:ext>
+    </p:extLst>
+  </p:cSld>
+  <p:clrMapOvr>
+    <a:masterClrMapping/>
+  </p:clrMapOvr>
+</p:notes>
+</file>
+
+<file path=ppt/notesSlides/notesSlide3.xml><?xml version="1.0" encoding="utf-8"?>
+<p:notes xmlns:a="http://schemas.openxmlformats.org/drawingml/2006/main" xmlns:r="http://schemas.openxmlformats.org/officeDocument/2006/relationships" xmlns:p="http://schemas.openxmlformats.org/presentationml/2006/main">
+  <p:cSld>
+    <p:spTree>
+      <p:nvGrpSpPr>
+        <p:cNvPr id="1" name=""/>
+        <p:cNvGrpSpPr/>
+        <p:nvPr/>
+      </p:nvGrpSpPr>
+      <p:grpSpPr>
+        <a:xfrm>
+          <a:off x="0" y="0"/>
+          <a:ext cx="0" cy="0"/>
+          <a:chOff x="0" y="0"/>
+          <a:chExt cx="0" cy="0"/>
+        </a:xfrm>
+      </p:grpSpPr>
+      <p:sp>
+        <p:nvSpPr>
+          <p:cNvPr id="2" name="Folienbildplatzhalter 1"/>
+          <p:cNvSpPr>
+            <a:spLocks noGrp="1" noRot="1" noChangeAspect="1"/>
+          </p:cNvSpPr>
+          <p:nvPr>
+            <p:ph type="sldImg"/>
+          </p:nvPr>
+        </p:nvSpPr>
+        <p:spPr/>
+      </p:sp>
+      <p:sp>
+        <p:nvSpPr>
+          <p:cNvPr id="3" name="Notizenplatzhalter 2"/>
+          <p:cNvSpPr>
+            <a:spLocks noGrp="1"/>
+          </p:cNvSpPr>
+          <p:nvPr>
+            <p:ph type="body" idx="1"/>
+          </p:nvPr>
+        </p:nvSpPr>
+        <p:spPr/>
+        <p:txBody>
+          <a:bodyPr/>
+          <a:lstStyle/>
+          <a:p>
+            <a:r>
+              <a:rPr lang="de-DE" dirty="0"/>
+              <a:t>Tracken mittels </a:t>
+            </a:r>
+            <a:r>
+              <a:rPr lang="de-DE" dirty="0" err="1"/>
+              <a:t>git</a:t>
+            </a:r>
+            <a:r>
+              <a:rPr lang="de-DE" dirty="0"/>
+              <a:t> </a:t>
+            </a:r>
+            <a:r>
+              <a:rPr lang="de-DE" dirty="0" err="1"/>
+              <a:t>status</a:t>
+            </a:r>
+            <a:endParaRPr lang="de-DE" dirty="0"/>
+          </a:p>
+          <a:p>
+            <a:endParaRPr lang="de-DE" dirty="0"/>
+          </a:p>
+        </p:txBody>
+      </p:sp>
+      <p:sp>
+        <p:nvSpPr>
+          <p:cNvPr id="4" name="Foliennummernplatzhalter 3"/>
+          <p:cNvSpPr>
+            <a:spLocks noGrp="1"/>
+          </p:cNvSpPr>
+          <p:nvPr>
+            <p:ph type="sldNum" sz="quarter" idx="5"/>
+          </p:nvPr>
+        </p:nvSpPr>
+        <p:spPr/>
+        <p:txBody>
+          <a:bodyPr/>
+          <a:lstStyle/>
+          <a:p>
+            <a:fld id="{18182567-388C-4D33-8B7B-A651F195F118}" type="slidenum">
+              <a:rPr lang="de-DE" altLang="de-DE" smtClean="0"/>
+              <a:pPr/>
+              <a:t>36</a:t>
+            </a:fld>
+            <a:endParaRPr lang="de-DE" altLang="de-DE"/>
+          </a:p>
+        </p:txBody>
+      </p:sp>
+    </p:spTree>
+    <p:extLst>
+      <p:ext uri="{BB962C8B-B14F-4D97-AF65-F5344CB8AC3E}">
+        <p14:creationId xmlns:p14="http://schemas.microsoft.com/office/powerpoint/2010/main" val="2983690892"/>
+      </p:ext>
+    </p:extLst>
+  </p:cSld>
+  <p:clrMapOvr>
+    <a:masterClrMapping/>
+  </p:clrMapOvr>
+</p:notes>
+</file>
+
+<file path=ppt/notesSlides/notesSlide4.xml><?xml version="1.0" encoding="utf-8"?>
+<p:notes xmlns:a="http://schemas.openxmlformats.org/drawingml/2006/main" xmlns:r="http://schemas.openxmlformats.org/officeDocument/2006/relationships" xmlns:p="http://schemas.openxmlformats.org/presentationml/2006/main">
+  <p:cSld>
+    <p:spTree>
+      <p:nvGrpSpPr>
+        <p:cNvPr id="1" name=""/>
+        <p:cNvGrpSpPr/>
+        <p:nvPr/>
+      </p:nvGrpSpPr>
+      <p:grpSpPr>
+        <a:xfrm>
+          <a:off x="0" y="0"/>
+          <a:ext cx="0" cy="0"/>
+          <a:chOff x="0" y="0"/>
+          <a:chExt cx="0" cy="0"/>
+        </a:xfrm>
+      </p:grpSpPr>
+      <p:sp>
+        <p:nvSpPr>
+          <p:cNvPr id="2" name="Folienbildplatzhalter 1"/>
+          <p:cNvSpPr>
+            <a:spLocks noGrp="1" noRot="1" noChangeAspect="1"/>
+          </p:cNvSpPr>
+          <p:nvPr>
+            <p:ph type="sldImg"/>
+          </p:nvPr>
+        </p:nvSpPr>
+        <p:spPr/>
+      </p:sp>
+      <p:sp>
+        <p:nvSpPr>
+          <p:cNvPr id="3" name="Notizenplatzhalter 2"/>
+          <p:cNvSpPr>
+            <a:spLocks noGrp="1"/>
+          </p:cNvSpPr>
+          <p:nvPr>
+            <p:ph type="body" idx="1"/>
+          </p:nvPr>
+        </p:nvSpPr>
+        <p:spPr/>
+        <p:txBody>
+          <a:bodyPr/>
+          <a:lstStyle/>
+          <a:p>
+            <a:pPr marL="0" marR="0" lvl="0" indent="0" algn="l" defTabSz="762000" rtl="0" eaLnBrk="0" fontAlgn="base" latinLnBrk="0" hangingPunct="0">
+              <a:lnSpc>
+                <a:spcPct val="100000"/>
+              </a:lnSpc>
+              <a:spcBef>
+                <a:spcPct val="30000"/>
+              </a:spcBef>
+              <a:spcAft>
+                <a:spcPct val="0"/>
+              </a:spcAft>
+              <a:buClrTx/>
+              <a:buSzTx/>
+              <a:buFontTx/>
+              <a:buNone/>
+              <a:tabLst/>
+              <a:defRPr/>
+            </a:pPr>
+            <a:r>
+              <a:rPr lang="de-DE" altLang="de-DE" dirty="0" err="1"/>
+              <a:t>Git</a:t>
+            </a:r>
+            <a:r>
+              <a:rPr lang="de-DE" altLang="de-DE" dirty="0"/>
+              <a:t> sollte Ihnen anzeigen, dass </a:t>
+            </a:r>
+            <a:r>
+              <a:rPr lang="de-DE" altLang="de-DE" dirty="0">
+                <a:solidFill>
+                  <a:srgbClr val="C00000"/>
+                </a:solidFill>
+              </a:rPr>
+              <a:t>new_file.txt </a:t>
+            </a:r>
+            <a:r>
+              <a:rPr lang="de-DE" altLang="de-DE" dirty="0"/>
+              <a:t>gelöscht wurde und </a:t>
+            </a:r>
+            <a:r>
+              <a:rPr lang="de-DE" altLang="de-DE" dirty="0">
+                <a:solidFill>
+                  <a:srgbClr val="C00000"/>
+                </a:solidFill>
+              </a:rPr>
+              <a:t>file2.txt </a:t>
+            </a:r>
+            <a:r>
+              <a:rPr lang="de-DE" altLang="de-DE" dirty="0"/>
+              <a:t>als </a:t>
+            </a:r>
+            <a:r>
+              <a:rPr lang="de-DE" altLang="de-DE" dirty="0" err="1"/>
+              <a:t>untracked</a:t>
+            </a:r>
+            <a:r>
+              <a:rPr lang="de-DE" altLang="de-DE" dirty="0"/>
+              <a:t> </a:t>
+            </a:r>
+            <a:r>
+              <a:rPr lang="de-DE" altLang="de-DE" dirty="0" err="1"/>
+              <a:t>file</a:t>
+            </a:r>
+            <a:r>
+              <a:rPr lang="de-DE" altLang="de-DE" dirty="0"/>
+              <a:t> zum Repository hinzugefügt wurde, was nicht direkt unsere Änderungen widerspiegelt.</a:t>
+            </a:r>
+          </a:p>
+          <a:p>
+            <a:endParaRPr lang="de-DE" dirty="0"/>
+          </a:p>
+        </p:txBody>
+      </p:sp>
+      <p:sp>
+        <p:nvSpPr>
+          <p:cNvPr id="4" name="Foliennummernplatzhalter 3"/>
+          <p:cNvSpPr>
+            <a:spLocks noGrp="1"/>
+          </p:cNvSpPr>
+          <p:nvPr>
+            <p:ph type="sldNum" sz="quarter" idx="5"/>
+          </p:nvPr>
+        </p:nvSpPr>
+        <p:spPr/>
+        <p:txBody>
+          <a:bodyPr/>
+          <a:lstStyle/>
+          <a:p>
+            <a:fld id="{18182567-388C-4D33-8B7B-A651F195F118}" type="slidenum">
+              <a:rPr lang="de-DE" altLang="de-DE" smtClean="0"/>
+              <a:pPr/>
+              <a:t>44</a:t>
+            </a:fld>
+            <a:endParaRPr lang="de-DE" altLang="de-DE"/>
+          </a:p>
+        </p:txBody>
+      </p:sp>
+    </p:spTree>
+    <p:extLst>
+      <p:ext uri="{BB962C8B-B14F-4D97-AF65-F5344CB8AC3E}">
+        <p14:creationId xmlns:p14="http://schemas.microsoft.com/office/powerpoint/2010/main" val="1224826783"/>
+      </p:ext>
+    </p:extLst>
+  </p:cSld>
+  <p:clrMapOvr>
+    <a:masterClrMapping/>
+  </p:clrMapOvr>
+</p:notes>
+</file>
+
 <file path=ppt/slideLayouts/slideLayout1.xml><?xml version="1.0" encoding="utf-8"?>
 <p:sldLayout xmlns:a="http://schemas.openxmlformats.org/drawingml/2006/main" xmlns:r="http://schemas.openxmlformats.org/officeDocument/2006/relationships" xmlns:p="http://schemas.openxmlformats.org/presentationml/2006/main" type="obj" preserve="1">
   <p:cSld name="Titel und Inhalt">
@@ -2346,7 +2834,7 @@
               <a:pPr algn="ctr">
                 <a:defRPr/>
               </a:pPr>
-              <a:t>06.07.2024</a:t>
+              <a:t>25.07.2024</a:t>
             </a:fld>
             <a:endParaRPr lang="de-DE" sz="1000" dirty="0">
               <a:solidFill>
@@ -4516,7 +5004,7 @@
               <a:pPr algn="ctr">
                 <a:defRPr/>
               </a:pPr>
-              <a:t>06.07.2024</a:t>
+              <a:t>25.07.2024</a:t>
             </a:fld>
             <a:endParaRPr lang="de-DE" sz="1000" dirty="0">
               <a:solidFill>
@@ -5951,7 +6439,7 @@
               <a:pPr algn="ctr">
                 <a:defRPr/>
               </a:pPr>
-              <a:t>06.07.2024</a:t>
+              <a:t>25.07.2024</a:t>
             </a:fld>
             <a:endParaRPr lang="de-DE" sz="1000">
               <a:solidFill>
@@ -8179,7 +8667,7 @@
           <a:p>
             <a:r>
               <a:rPr lang="de-DE" altLang="de-DE" dirty="0"/>
-              <a:t>Änderungen werden im eigenen lokalen Workspace vorgenommen und anschließend wieder ans Remote Repository gesendet (</a:t>
+              <a:t>Dateien werden lokal geändert und ans Remote Repository gesendet (</a:t>
             </a:r>
             <a:r>
               <a:rPr lang="de-DE" altLang="de-DE" i="1" dirty="0"/>
@@ -8193,13 +8681,13 @@
           <a:p>
             <a:r>
               <a:rPr lang="de-DE" altLang="de-DE" dirty="0"/>
-              <a:t>Durch lokale Änderungen entstehen zunächst keine Konflikte bei Änderung von mehreren Entwicklern an einer Datei</a:t>
+              <a:t>Keine Konflikte bei jeweils lokalen Änderungen durch mehrere Benutzer</a:t>
             </a:r>
           </a:p>
           <a:p>
             <a:r>
               <a:rPr lang="de-DE" altLang="de-DE" dirty="0"/>
-              <a:t>Eventuelle Konflikte müssen bei der Zusammenfügung im Remote Repository aufgelöst werden</a:t>
+              <a:t>Konflikte werden beim Zusammenführen im Remote Repository aufgelöst</a:t>
             </a:r>
           </a:p>
         </p:txBody>
@@ -9792,143 +10280,23 @@
           <a:p>
             <a:pPr lvl="1"/>
             <a:r>
-              <a:rPr lang="de-DE" altLang="de-DE" b="1" dirty="0"/>
+              <a:rPr lang="de-DE" altLang="de-DE" sz="1800" dirty="0"/>
               <a:t>Systemkonfiguration</a:t>
             </a:r>
           </a:p>
           <a:p>
-            <a:pPr lvl="2"/>
-            <a:r>
-              <a:rPr lang="de-DE" altLang="de-DE" dirty="0"/>
-              <a:t>/</a:t>
-            </a:r>
-            <a:r>
-              <a:rPr lang="de-DE" altLang="de-DE" dirty="0" err="1"/>
-              <a:t>etc</a:t>
-            </a:r>
-            <a:r>
-              <a:rPr lang="de-DE" altLang="de-DE" dirty="0"/>
-              <a:t>/</a:t>
-            </a:r>
-            <a:r>
-              <a:rPr lang="de-DE" altLang="de-DE" dirty="0" err="1"/>
-              <a:t>gitconfig</a:t>
-            </a:r>
-            <a:r>
-              <a:rPr lang="de-DE" altLang="de-DE" dirty="0"/>
-              <a:t> (Linux)</a:t>
-            </a:r>
-          </a:p>
-          <a:p>
-            <a:pPr lvl="2"/>
-            <a:r>
-              <a:rPr lang="de-DE" altLang="de-DE" dirty="0"/>
-              <a:t>C:\ProgrammData\Git\config oder C:\Programm Files\</a:t>
-            </a:r>
-            <a:r>
-              <a:rPr lang="de-DE" altLang="de-DE" dirty="0" err="1"/>
-              <a:t>Git</a:t>
-            </a:r>
-            <a:r>
-              <a:rPr lang="de-DE" altLang="de-DE" dirty="0"/>
-              <a:t>\</a:t>
-            </a:r>
-            <a:r>
-              <a:rPr lang="de-DE" altLang="de-DE" dirty="0" err="1"/>
-              <a:t>etc</a:t>
-            </a:r>
-            <a:r>
-              <a:rPr lang="de-DE" altLang="de-DE" dirty="0"/>
-              <a:t>\</a:t>
-            </a:r>
-            <a:r>
-              <a:rPr lang="de-DE" altLang="de-DE" dirty="0" err="1"/>
-              <a:t>gitconfig</a:t>
-            </a:r>
-            <a:r>
-              <a:rPr lang="de-DE" altLang="de-DE" dirty="0"/>
-              <a:t> (Windows, </a:t>
-            </a:r>
-            <a:r>
-              <a:rPr lang="de-DE" altLang="de-DE" dirty="0" err="1"/>
-              <a:t>Git</a:t>
-            </a:r>
-            <a:r>
-              <a:rPr lang="de-DE" altLang="de-DE" dirty="0"/>
-              <a:t> Version 2.x oder neuer)</a:t>
-            </a:r>
-          </a:p>
-          <a:p>
             <a:pPr lvl="1"/>
             <a:r>
-              <a:rPr lang="de-DE" altLang="de-DE" b="1" dirty="0"/>
+              <a:rPr lang="de-DE" altLang="de-DE" sz="1800" dirty="0"/>
               <a:t>Userkonfiguration</a:t>
             </a:r>
           </a:p>
           <a:p>
-            <a:pPr lvl="2"/>
-            <a:r>
-              <a:rPr lang="de-DE" altLang="de-DE" dirty="0"/>
-              <a:t>~/.</a:t>
-            </a:r>
-            <a:r>
-              <a:rPr lang="de-DE" altLang="de-DE" dirty="0" err="1"/>
-              <a:t>gitconfig</a:t>
-            </a:r>
-            <a:r>
-              <a:rPr lang="de-DE" altLang="de-DE" dirty="0"/>
-              <a:t> oder ~/.</a:t>
-            </a:r>
-            <a:r>
-              <a:rPr lang="de-DE" altLang="de-DE" dirty="0" err="1"/>
-              <a:t>config</a:t>
-            </a:r>
-            <a:r>
-              <a:rPr lang="de-DE" altLang="de-DE" dirty="0"/>
-              <a:t>/</a:t>
-            </a:r>
-            <a:r>
-              <a:rPr lang="de-DE" altLang="de-DE" dirty="0" err="1"/>
-              <a:t>gitconfig</a:t>
-            </a:r>
-            <a:r>
-              <a:rPr lang="de-DE" altLang="de-DE" dirty="0"/>
-              <a:t> (Linux)</a:t>
-            </a:r>
-          </a:p>
-          <a:p>
-            <a:pPr lvl="2"/>
-            <a:r>
-              <a:rPr lang="de-DE" altLang="de-DE" dirty="0"/>
-              <a:t>C:\User\&lt;User&gt;\.gitconfig (Windows)</a:t>
-            </a:r>
-          </a:p>
-          <a:p>
             <a:pPr lvl="1"/>
             <a:r>
-              <a:rPr lang="de-DE" altLang="de-DE" b="1" dirty="0"/>
+              <a:rPr lang="de-DE" altLang="de-DE" sz="1800" dirty="0"/>
               <a:t>Projektkonfiguration</a:t>
             </a:r>
-          </a:p>
-          <a:p>
-            <a:pPr lvl="2"/>
-            <a:r>
-              <a:rPr lang="de-DE" altLang="de-DE" dirty="0"/>
-              <a:t>&lt;Pfad zum Projekt&gt;/.</a:t>
-            </a:r>
-            <a:r>
-              <a:rPr lang="de-DE" altLang="de-DE" dirty="0" err="1"/>
-              <a:t>git</a:t>
-            </a:r>
-            <a:r>
-              <a:rPr lang="de-DE" altLang="de-DE" dirty="0"/>
-              <a:t>/</a:t>
-            </a:r>
-            <a:r>
-              <a:rPr lang="de-DE" altLang="de-DE" dirty="0" err="1"/>
-              <a:t>config</a:t>
-            </a:r>
-            <a:endParaRPr lang="de-DE" altLang="de-DE" dirty="0"/>
           </a:p>
           <a:p>
             <a:r>
@@ -12303,8 +12671,11 @@
             </a:pPr>
             <a:r>
               <a:rPr lang="de-DE" altLang="de-DE" b="1" dirty="0"/>
-              <a:t>Übungsaufgabe 1: Installation</a:t>
-            </a:r>
+              <a:t>Setup</a:t>
+            </a:r>
+            <a:endParaRPr lang="de-DE" altLang="de-DE" dirty="0">
+              <a:latin typeface="Consolas" panose="020B0609020204030204" pitchFamily="49" charset="0"/>
+            </a:endParaRPr>
           </a:p>
           <a:p>
             <a:pPr marL="457200" indent="-457200">
@@ -12313,118 +12684,18 @@
             </a:pPr>
             <a:r>
               <a:rPr lang="de-DE" altLang="de-DE" dirty="0"/>
-              <a:t>Überprüfen Sie, ob eine aktuelle Version von </a:t>
-            </a:r>
-            <a:r>
-              <a:rPr lang="de-DE" altLang="de-DE" dirty="0" err="1"/>
-              <a:t>Git</a:t>
-            </a:r>
-            <a:r>
-              <a:rPr lang="de-DE" altLang="de-DE" dirty="0"/>
-              <a:t> auf Ihrem Rechner installiert ist mit dem Befehl </a:t>
-            </a:r>
-            <a:r>
-              <a:rPr lang="de-DE" altLang="de-DE" dirty="0" err="1">
-                <a:latin typeface="Consolas" panose="020B0609020204030204" pitchFamily="49" charset="0"/>
-              </a:rPr>
-              <a:t>git</a:t>
-            </a:r>
+              <a:t>Mittels folgender Installation Installieren</a:t>
+            </a:r>
+          </a:p>
+          <a:p>
+            <a:pPr marL="857250" lvl="1" indent="-457200"/>
             <a:r>
               <a:rPr lang="de-DE" altLang="de-DE" dirty="0">
-                <a:latin typeface="Consolas" panose="020B0609020204030204" pitchFamily="49" charset="0"/>
-              </a:rPr>
-              <a:t> -v</a:t>
-            </a:r>
-          </a:p>
-          <a:p>
-            <a:pPr marL="400050" lvl="1" indent="0">
-              <a:spcBef>
-                <a:spcPts val="0"/>
-              </a:spcBef>
-              <a:buNone/>
-            </a:pPr>
-            <a:endParaRPr lang="de-DE" altLang="de-DE" dirty="0">
-              <a:latin typeface="Consolas" panose="020B0609020204030204" pitchFamily="49" charset="0"/>
-            </a:endParaRPr>
-          </a:p>
-          <a:p>
-            <a:pPr marL="444500" lvl="1" indent="0">
-              <a:spcBef>
-                <a:spcPts val="0"/>
-              </a:spcBef>
-              <a:buNone/>
-              <a:tabLst>
-                <a:tab pos="444500" algn="l"/>
-                <a:tab pos="538163" algn="l"/>
-                <a:tab pos="1077913" algn="l"/>
-              </a:tabLst>
-            </a:pPr>
-            <a:r>
-              <a:rPr lang="de-DE" altLang="de-DE" dirty="0">
-                <a:latin typeface="Consolas" panose="020B0609020204030204" pitchFamily="49" charset="0"/>
-              </a:rPr>
-              <a:t>$ </a:t>
-            </a:r>
-            <a:r>
-              <a:rPr lang="de-DE" altLang="de-DE" dirty="0" err="1">
-                <a:latin typeface="Consolas" panose="020B0609020204030204" pitchFamily="49" charset="0"/>
-              </a:rPr>
-              <a:t>git</a:t>
-            </a:r>
-            <a:r>
-              <a:rPr lang="de-DE" altLang="de-DE" dirty="0">
-                <a:latin typeface="Consolas" panose="020B0609020204030204" pitchFamily="49" charset="0"/>
-              </a:rPr>
-              <a:t> -v</a:t>
-            </a:r>
-          </a:p>
-          <a:p>
-            <a:pPr marL="444500" lvl="1" indent="0">
-              <a:spcBef>
-                <a:spcPts val="0"/>
-              </a:spcBef>
-              <a:buNone/>
-              <a:tabLst>
-                <a:tab pos="444500" algn="l"/>
-                <a:tab pos="538163" algn="l"/>
-                <a:tab pos="1077913" algn="l"/>
-              </a:tabLst>
-            </a:pPr>
-            <a:r>
-              <a:rPr lang="de-DE" altLang="de-DE" dirty="0" err="1">
-                <a:latin typeface="Consolas" panose="020B0609020204030204" pitchFamily="49" charset="0"/>
-              </a:rPr>
-              <a:t>git</a:t>
-            </a:r>
-            <a:r>
-              <a:rPr lang="de-DE" altLang="de-DE" dirty="0">
-                <a:latin typeface="Consolas" panose="020B0609020204030204" pitchFamily="49" charset="0"/>
-              </a:rPr>
-              <a:t> </a:t>
-            </a:r>
-            <a:r>
-              <a:rPr lang="de-DE" altLang="de-DE" dirty="0" err="1">
-                <a:latin typeface="Consolas" panose="020B0609020204030204" pitchFamily="49" charset="0"/>
-              </a:rPr>
-              <a:t>version</a:t>
-            </a:r>
-            <a:r>
-              <a:rPr lang="de-DE" altLang="de-DE" dirty="0">
-                <a:latin typeface="Consolas" panose="020B0609020204030204" pitchFamily="49" charset="0"/>
-              </a:rPr>
-              <a:t> 2.34.1</a:t>
-            </a:r>
-          </a:p>
-          <a:p>
-            <a:pPr marL="400050" lvl="1" indent="0">
-              <a:spcBef>
-                <a:spcPts val="0"/>
-              </a:spcBef>
-              <a:buNone/>
-            </a:pPr>
-            <a:endParaRPr lang="de-DE" altLang="de-DE" dirty="0">
-              <a:latin typeface="Consolas" panose="020B0609020204030204" pitchFamily="49" charset="0"/>
-            </a:endParaRPr>
+                <a:hlinkClick r:id="rId2"/>
+              </a:rPr>
+              <a:t>https://git-scm.com/book/de/v2/Erste-Schritte-Git-installieren</a:t>
+            </a:r>
+            <a:endParaRPr lang="de-DE" altLang="de-DE" dirty="0"/>
           </a:p>
           <a:p>
             <a:pPr marL="457200" indent="-457200">
@@ -12433,27 +12704,15 @@
             </a:pPr>
             <a:r>
               <a:rPr lang="de-DE" altLang="de-DE" dirty="0"/>
-              <a:t>Falls keine aktuelle Version installiert ist, folgen Sie der Anleitung auf </a:t>
-            </a:r>
-            <a:r>
-              <a:rPr lang="de-DE" altLang="de-DE" dirty="0">
-                <a:hlinkClick r:id="rId2"/>
-              </a:rPr>
-              <a:t>https://git-scm.com/book/de/v2/Erste-Schritte-Git-installieren</a:t>
+              <a:t>Global Namen und E-Mail </a:t>
+            </a:r>
+            <a:r>
+              <a:rPr lang="de-DE" altLang="de-DE" dirty="0" err="1"/>
+              <a:t>Addresse</a:t>
             </a:r>
             <a:r>
               <a:rPr lang="de-DE" altLang="de-DE" dirty="0"/>
-              <a:t> für Ihr jeweiliges System</a:t>
-            </a:r>
-          </a:p>
-          <a:p>
-            <a:pPr marL="457200" indent="-457200">
-              <a:buFont typeface="+mj-lt"/>
-              <a:buAutoNum type="arabicPeriod"/>
-            </a:pPr>
-            <a:r>
-              <a:rPr lang="de-DE" altLang="de-DE" dirty="0"/>
-              <a:t>Falls noch nicht geschehen, setzen Sie mit dem folgenden Befehl Ihren globalen Namen sowie Ihre E-Mail</a:t>
+              <a:t> setzen</a:t>
             </a:r>
           </a:p>
           <a:p>
@@ -12643,7 +12902,7 @@
             </a:pPr>
             <a:r>
               <a:rPr lang="de-DE" altLang="de-DE" b="1" dirty="0"/>
-              <a:t>Übungsaufgabe 2: Repository anlegen</a:t>
+              <a:t>Übungsaufgabe 1: Repository anlegen</a:t>
             </a:r>
           </a:p>
           <a:p>
@@ -12975,7 +13234,7 @@
             </a:pPr>
             <a:r>
               <a:rPr lang="de-DE" altLang="de-DE" b="1" dirty="0"/>
-              <a:t>Lösung Übungsaufgabe 2: Repository anlegen</a:t>
+              <a:t>Lösung Übungsaufgabe 1: Repository anlegen</a:t>
             </a:r>
           </a:p>
           <a:p>
@@ -16702,7 +16961,7 @@
             </a:pPr>
             <a:r>
               <a:rPr lang="de-DE" altLang="de-DE" b="1" dirty="0"/>
-              <a:t>Übungsaufgabe 3: Erste </a:t>
+              <a:t>Übungsaufgabe 2: Erste </a:t>
             </a:r>
             <a:r>
               <a:rPr lang="de-DE" altLang="de-DE" b="1" dirty="0" err="1"/>
@@ -16744,35 +17003,7 @@
             </a:pPr>
             <a:r>
               <a:rPr lang="de-DE" altLang="de-DE" dirty="0"/>
-              <a:t>Führen Sie den Befehl </a:t>
-            </a:r>
-            <a:r>
-              <a:rPr lang="de-DE" altLang="de-DE" dirty="0" err="1">
-                <a:latin typeface="Consolas" panose="020B0609020204030204" pitchFamily="49" charset="0"/>
-              </a:rPr>
-              <a:t>git</a:t>
-            </a:r>
-            <a:r>
-              <a:rPr lang="de-DE" altLang="de-DE" dirty="0">
-                <a:latin typeface="Consolas" panose="020B0609020204030204" pitchFamily="49" charset="0"/>
-              </a:rPr>
-              <a:t> </a:t>
-            </a:r>
-            <a:r>
-              <a:rPr lang="de-DE" altLang="de-DE" dirty="0" err="1">
-                <a:latin typeface="Consolas" panose="020B0609020204030204" pitchFamily="49" charset="0"/>
-              </a:rPr>
-              <a:t>status</a:t>
-            </a:r>
-            <a:r>
-              <a:rPr lang="de-DE" altLang="de-DE" dirty="0">
-                <a:latin typeface="Consolas" panose="020B0609020204030204" pitchFamily="49" charset="0"/>
-              </a:rPr>
-              <a:t> </a:t>
-            </a:r>
-            <a:r>
-              <a:rPr lang="de-DE" altLang="de-DE" dirty="0"/>
-              <a:t>aus. </a:t>
+              <a:t>Lassen Sie </a:t>
             </a:r>
             <a:r>
               <a:rPr lang="de-DE" altLang="de-DE" dirty="0" err="1"/>
@@ -16780,7 +17011,43 @@
             </a:r>
             <a:r>
               <a:rPr lang="de-DE" altLang="de-DE" dirty="0"/>
-              <a:t> zeigt Ihnen an, dass </a:t>
+              <a:t> diese Datei tracken.</a:t>
+            </a:r>
+          </a:p>
+          <a:p>
+            <a:pPr marL="457200" indent="-457200">
+              <a:buFont typeface="+mj-lt"/>
+              <a:buAutoNum type="arabicPeriod"/>
+            </a:pPr>
+            <a:r>
+              <a:rPr lang="de-DE" altLang="de-DE" dirty="0"/>
+              <a:t>Committen Sie nun Ihre hinzugefügte Datei mit der Commit-Nachricht „</a:t>
+            </a:r>
+            <a:r>
+              <a:rPr lang="de-DE" altLang="de-DE" dirty="0" err="1"/>
+              <a:t>Added</a:t>
+            </a:r>
+            <a:r>
+              <a:rPr lang="de-DE" altLang="de-DE" dirty="0"/>
+              <a:t> file1.txt </a:t>
+            </a:r>
+            <a:r>
+              <a:rPr lang="de-DE" altLang="de-DE" dirty="0" err="1"/>
+              <a:t>file</a:t>
+            </a:r>
+            <a:r>
+              <a:rPr lang="de-DE" altLang="de-DE" dirty="0"/>
+              <a:t>“.</a:t>
+            </a:r>
+          </a:p>
+          <a:p>
+            <a:pPr marL="457200" indent="-457200">
+              <a:buFont typeface="+mj-lt"/>
+              <a:buAutoNum type="arabicPeriod"/>
+            </a:pPr>
+            <a:r>
+              <a:rPr lang="de-DE" altLang="de-DE" dirty="0"/>
+              <a:t>Füllen Sie nun Ihre </a:t>
             </a:r>
             <a:r>
               <a:rPr lang="de-DE" altLang="de-DE" dirty="0">
@@ -16788,70 +17055,52 @@
                   <a:srgbClr val="C00000"/>
                 </a:solidFill>
               </a:rPr>
-              <a:t>file1.txt</a:t>
+              <a:t>file1.txt </a:t>
             </a:r>
             <a:r>
               <a:rPr lang="de-DE" altLang="de-DE" dirty="0"/>
-              <a:t> aktuell nicht von </a:t>
+              <a:t>mit dem Inhalt „file1 </a:t>
             </a:r>
             <a:r>
               <a:rPr lang="de-DE" altLang="de-DE" dirty="0" err="1"/>
-              <a:t>Git</a:t>
+              <a:t>content</a:t>
             </a:r>
             <a:r>
               <a:rPr lang="de-DE" altLang="de-DE" dirty="0"/>
-              <a:t> versioniert wird. </a:t>
+              <a:t>“.</a:t>
+            </a:r>
+          </a:p>
+          <a:p>
+            <a:pPr marL="457200" indent="-457200">
+              <a:buFont typeface="+mj-lt"/>
+              <a:buAutoNum type="arabicPeriod"/>
+            </a:pPr>
+            <a:r>
+              <a:rPr lang="de-DE" altLang="de-DE" dirty="0"/>
+              <a:t>Lassen Sie sich mit </a:t>
+            </a:r>
+            <a:r>
+              <a:rPr lang="de-DE" altLang="de-DE" dirty="0" err="1"/>
+              <a:t>git</a:t>
+            </a:r>
+            <a:r>
+              <a:rPr lang="de-DE" altLang="de-DE" dirty="0"/>
+              <a:t> </a:t>
+            </a:r>
+            <a:r>
+              <a:rPr lang="de-DE" altLang="de-DE" dirty="0" err="1"/>
+              <a:t>status</a:t>
+            </a:r>
+            <a:r>
+              <a:rPr lang="de-DE" altLang="de-DE" dirty="0"/>
+              <a:t> den aktuellen Stand anzeigen.</a:t>
             </a:r>
             <a:br>
               <a:rPr lang="de-DE" altLang="de-DE" dirty="0"/>
             </a:br>
             <a:r>
               <a:rPr lang="de-DE" altLang="de-DE" dirty="0"/>
-              <a:t>Lassen Sie </a:t>
-            </a:r>
-            <a:r>
-              <a:rPr lang="de-DE" altLang="de-DE" dirty="0" err="1"/>
-              <a:t>Git</a:t>
-            </a:r>
-            <a:r>
-              <a:rPr lang="de-DE" altLang="de-DE" dirty="0"/>
-              <a:t> diese Datei tracken.</a:t>
-            </a:r>
-          </a:p>
-          <a:p>
-            <a:pPr marL="457200" indent="-457200">
-              <a:buFont typeface="+mj-lt"/>
-              <a:buAutoNum type="arabicPeriod"/>
-            </a:pPr>
-            <a:r>
-              <a:rPr lang="de-DE" altLang="de-DE" dirty="0"/>
-              <a:t>Committen Sie nun Ihre hinzugefügte Datei mit der Commit-Nachricht „</a:t>
-            </a:r>
-            <a:r>
-              <a:rPr lang="de-DE" altLang="de-DE" dirty="0" err="1"/>
-              <a:t>Added</a:t>
-            </a:r>
-            <a:r>
-              <a:rPr lang="de-DE" altLang="de-DE" dirty="0"/>
-              <a:t> file1.txt </a:t>
-            </a:r>
-            <a:r>
-              <a:rPr lang="de-DE" altLang="de-DE" dirty="0" err="1"/>
-              <a:t>file</a:t>
-            </a:r>
-            <a:r>
-              <a:rPr lang="de-DE" altLang="de-DE" dirty="0"/>
-              <a:t>“.</a:t>
-            </a:r>
-          </a:p>
-          <a:p>
-            <a:pPr marL="457200" indent="-457200">
-              <a:buFont typeface="+mj-lt"/>
-              <a:buAutoNum type="arabicPeriod"/>
-            </a:pPr>
-            <a:r>
-              <a:rPr lang="de-DE" altLang="de-DE" dirty="0"/>
-              <a:t>Füllen Sie nun Ihre </a:t>
+              <a:t>Fügen Sie </a:t>
             </a:r>
             <a:r>
               <a:rPr lang="de-DE" altLang="de-DE" dirty="0">
@@ -16863,15 +17112,15 @@
             </a:r>
             <a:r>
               <a:rPr lang="de-DE" altLang="de-DE" dirty="0"/>
-              <a:t>mit dem Inhalt „file1 </a:t>
+              <a:t>zur </a:t>
             </a:r>
             <a:r>
               <a:rPr lang="de-DE" altLang="de-DE" dirty="0" err="1"/>
-              <a:t>content</a:t>
+              <a:t>Staging</a:t>
             </a:r>
             <a:r>
               <a:rPr lang="de-DE" altLang="de-DE" dirty="0"/>
-              <a:t>“.</a:t>
+              <a:t> Area hinzu.</a:t>
             </a:r>
           </a:p>
           <a:p>
@@ -16881,108 +17130,7 @@
             </a:pPr>
             <a:r>
               <a:rPr lang="de-DE" altLang="de-DE" dirty="0"/>
-              <a:t>Führen Sie erneut den Befehl </a:t>
-            </a:r>
-            <a:r>
-              <a:rPr lang="de-DE" altLang="de-DE" dirty="0" err="1">
-                <a:latin typeface="Consolas" panose="020B0609020204030204" pitchFamily="49" charset="0"/>
-              </a:rPr>
-              <a:t>git</a:t>
-            </a:r>
-            <a:r>
-              <a:rPr lang="de-DE" altLang="de-DE" dirty="0">
-                <a:latin typeface="Consolas" panose="020B0609020204030204" pitchFamily="49" charset="0"/>
-              </a:rPr>
-              <a:t> </a:t>
-            </a:r>
-            <a:r>
-              <a:rPr lang="de-DE" altLang="de-DE" dirty="0" err="1">
-                <a:latin typeface="Consolas" panose="020B0609020204030204" pitchFamily="49" charset="0"/>
-              </a:rPr>
-              <a:t>status</a:t>
-            </a:r>
-            <a:r>
-              <a:rPr lang="de-DE" altLang="de-DE" dirty="0">
-                <a:latin typeface="Consolas" panose="020B0609020204030204" pitchFamily="49" charset="0"/>
-              </a:rPr>
-              <a:t> </a:t>
-            </a:r>
-            <a:r>
-              <a:rPr lang="de-DE" altLang="de-DE" dirty="0"/>
-              <a:t>aus. Ihnen wird nun angezeigt, dass </a:t>
-            </a:r>
-            <a:r>
-              <a:rPr lang="de-DE" altLang="de-DE" dirty="0">
-                <a:solidFill>
-                  <a:srgbClr val="C00000"/>
-                </a:solidFill>
-              </a:rPr>
-              <a:t>file1.txt </a:t>
-            </a:r>
-            <a:r>
-              <a:rPr lang="de-DE" altLang="de-DE" dirty="0"/>
-              <a:t>modifiziert wurde.</a:t>
-            </a:r>
-            <a:br>
-              <a:rPr lang="de-DE" altLang="de-DE" dirty="0"/>
-            </a:br>
-            <a:r>
-              <a:rPr lang="de-DE" altLang="de-DE" dirty="0"/>
-              <a:t>Fügen Sie </a:t>
-            </a:r>
-            <a:r>
-              <a:rPr lang="de-DE" altLang="de-DE" dirty="0">
-                <a:solidFill>
-                  <a:srgbClr val="C00000"/>
-                </a:solidFill>
-              </a:rPr>
-              <a:t>file1.txt </a:t>
-            </a:r>
-            <a:r>
-              <a:rPr lang="de-DE" altLang="de-DE" dirty="0"/>
-              <a:t>zur </a:t>
-            </a:r>
-            <a:r>
-              <a:rPr lang="de-DE" altLang="de-DE" dirty="0" err="1"/>
-              <a:t>Staging</a:t>
-            </a:r>
-            <a:r>
-              <a:rPr lang="de-DE" altLang="de-DE" dirty="0"/>
-              <a:t> Area hinzu.</a:t>
-            </a:r>
-          </a:p>
-          <a:p>
-            <a:pPr marL="457200" indent="-457200">
-              <a:buFont typeface="+mj-lt"/>
-              <a:buAutoNum type="arabicPeriod"/>
-            </a:pPr>
-            <a:r>
-              <a:rPr lang="de-DE" altLang="de-DE" dirty="0"/>
-              <a:t>Erstellen Sie einen zweiten </a:t>
-            </a:r>
-            <a:r>
-              <a:rPr lang="de-DE" altLang="de-DE" dirty="0">
-                <a:solidFill>
-                  <a:srgbClr val="C00000"/>
-                </a:solidFill>
-              </a:rPr>
-              <a:t>Commit</a:t>
-            </a:r>
-            <a:r>
-              <a:rPr lang="de-DE" altLang="de-DE" dirty="0"/>
-              <a:t>, um die Änderungen an </a:t>
-            </a:r>
-            <a:r>
-              <a:rPr lang="de-DE" altLang="de-DE" dirty="0">
-                <a:solidFill>
-                  <a:srgbClr val="C00000"/>
-                </a:solidFill>
-              </a:rPr>
-              <a:t>file1.txt </a:t>
-            </a:r>
-            <a:r>
-              <a:rPr lang="de-DE" altLang="de-DE" dirty="0"/>
-              <a:t>zu speichern. Wählen Sie dabei eine geeignete Commit-Message.</a:t>
+              <a:t>Committen Sie die Änderung mit einer passenden Commit-Nachricht.</a:t>
             </a:r>
           </a:p>
         </p:txBody>
@@ -17091,7 +17239,7 @@
             </a:pPr>
             <a:r>
               <a:rPr lang="de-DE" altLang="de-DE" b="1" dirty="0"/>
-              <a:t>Lösung Übungsaufgabe 3: Erste </a:t>
+              <a:t>Lösung Übungsaufgabe 2: Erste </a:t>
             </a:r>
             <a:r>
               <a:rPr lang="de-DE" altLang="de-DE" b="1" dirty="0" err="1"/>
@@ -17228,6 +17376,46 @@
                 <a:latin typeface="Consolas" panose="020B0609020204030204" pitchFamily="49" charset="0"/>
               </a:rPr>
             </a:br>
+            <a:br>
+              <a:rPr lang="en-US" altLang="de-DE" sz="1400" dirty="0">
+                <a:latin typeface="Consolas" panose="020B0609020204030204" pitchFamily="49" charset="0"/>
+              </a:rPr>
+            </a:br>
+            <a:r>
+              <a:rPr lang="de-DE" altLang="de-DE" sz="1400" dirty="0">
+                <a:latin typeface="Consolas" panose="020B0609020204030204" pitchFamily="49" charset="0"/>
+              </a:rPr>
+              <a:t>$ </a:t>
+            </a:r>
+            <a:r>
+              <a:rPr lang="de-DE" altLang="de-DE" sz="1400" dirty="0" err="1">
+                <a:latin typeface="Consolas" panose="020B0609020204030204" pitchFamily="49" charset="0"/>
+              </a:rPr>
+              <a:t>git</a:t>
+            </a:r>
+            <a:r>
+              <a:rPr lang="de-DE" altLang="de-DE" sz="1400" dirty="0">
+                <a:latin typeface="Consolas" panose="020B0609020204030204" pitchFamily="49" charset="0"/>
+              </a:rPr>
+              <a:t> </a:t>
+            </a:r>
+            <a:r>
+              <a:rPr lang="de-DE" altLang="de-DE" sz="1400" dirty="0" err="1">
+                <a:latin typeface="Consolas" panose="020B0609020204030204" pitchFamily="49" charset="0"/>
+              </a:rPr>
+              <a:t>add</a:t>
+            </a:r>
+            <a:r>
+              <a:rPr lang="de-DE" altLang="de-DE" sz="1400" dirty="0">
+                <a:latin typeface="Consolas" panose="020B0609020204030204" pitchFamily="49" charset="0"/>
+              </a:rPr>
+              <a:t> file1.txt</a:t>
+            </a:r>
+            <a:br>
+              <a:rPr lang="en-US" altLang="de-DE" sz="1400" dirty="0">
+                <a:latin typeface="Consolas" panose="020B0609020204030204" pitchFamily="49" charset="0"/>
+              </a:rPr>
+            </a:br>
             <a:endParaRPr lang="de-DE" altLang="de-DE" sz="1400" dirty="0">
               <a:latin typeface="Consolas" panose="020B0609020204030204" pitchFamily="49" charset="0"/>
             </a:endParaRPr>
@@ -17237,46 +17425,6 @@
               <a:buFont typeface="+mj-lt"/>
               <a:buAutoNum type="arabicPeriod"/>
             </a:pPr>
-            <a:r>
-              <a:rPr lang="de-DE" altLang="de-DE" sz="1400" dirty="0">
-                <a:latin typeface="Consolas" panose="020B0609020204030204" pitchFamily="49" charset="0"/>
-              </a:rPr>
-              <a:t>$ </a:t>
-            </a:r>
-            <a:r>
-              <a:rPr lang="de-DE" altLang="de-DE" sz="1400" dirty="0" err="1">
-                <a:latin typeface="Consolas" panose="020B0609020204030204" pitchFamily="49" charset="0"/>
-              </a:rPr>
-              <a:t>git</a:t>
-            </a:r>
-            <a:r>
-              <a:rPr lang="de-DE" altLang="de-DE" sz="1400" dirty="0">
-                <a:latin typeface="Consolas" panose="020B0609020204030204" pitchFamily="49" charset="0"/>
-              </a:rPr>
-              <a:t> </a:t>
-            </a:r>
-            <a:r>
-              <a:rPr lang="de-DE" altLang="de-DE" sz="1400" dirty="0" err="1">
-                <a:latin typeface="Consolas" panose="020B0609020204030204" pitchFamily="49" charset="0"/>
-              </a:rPr>
-              <a:t>add</a:t>
-            </a:r>
-            <a:r>
-              <a:rPr lang="de-DE" altLang="de-DE" sz="1400" dirty="0">
-                <a:latin typeface="Consolas" panose="020B0609020204030204" pitchFamily="49" charset="0"/>
-              </a:rPr>
-              <a:t> file1.txt</a:t>
-            </a:r>
-            <a:br>
-              <a:rPr lang="de-DE" altLang="de-DE" sz="1400" dirty="0">
-                <a:latin typeface="Consolas" panose="020B0609020204030204" pitchFamily="49" charset="0"/>
-              </a:rPr>
-            </a:br>
-            <a:br>
-              <a:rPr lang="de-DE" altLang="de-DE" sz="1400" dirty="0">
-                <a:latin typeface="Consolas" panose="020B0609020204030204" pitchFamily="49" charset="0"/>
-              </a:rPr>
-            </a:br>
             <a:r>
               <a:rPr lang="de-DE" altLang="de-DE" sz="1400" dirty="0">
                 <a:latin typeface="Consolas" panose="020B0609020204030204" pitchFamily="49" charset="0"/>
@@ -17593,7 +17741,7 @@
             </a:pPr>
             <a:r>
               <a:rPr lang="de-DE" altLang="de-DE" b="1" dirty="0"/>
-              <a:t>Lösung Übungsaufgabe 3: Erste </a:t>
+              <a:t>Lösung Übungsaufgabe 2: Erste </a:t>
             </a:r>
             <a:r>
               <a:rPr lang="de-DE" altLang="de-DE" b="1" dirty="0" err="1"/>
@@ -21803,7 +21951,7 @@
             </a:pPr>
             <a:r>
               <a:rPr lang="de-DE" altLang="de-DE" b="1" dirty="0"/>
-              <a:t>Übungsaufgabe 4: Umbenennen von Dateien</a:t>
+              <a:t>Übungsaufgabe 3: Umbenennen von Dateien</a:t>
             </a:r>
           </a:p>
           <a:p>
@@ -21875,17 +22023,7 @@
             </a:r>
             <a:r>
               <a:rPr lang="de-DE" altLang="de-DE" dirty="0"/>
-              <a:t>um (Beispielsweise </a:t>
-            </a:r>
-            <a:r>
-              <a:rPr lang="de-DE" altLang="de-DE" dirty="0">
-                <a:latin typeface="Consolas" panose="020B0609020204030204" pitchFamily="49" charset="0"/>
-              </a:rPr>
-              <a:t>mv new_file.txt file2.txt </a:t>
-            </a:r>
-            <a:r>
-              <a:rPr lang="de-DE" altLang="de-DE" dirty="0"/>
-              <a:t>unter Linux).</a:t>
+              <a:t>um.</a:t>
             </a:r>
           </a:p>
           <a:p>
@@ -21925,54 +22063,6 @@
               <a:rPr lang="de-DE" altLang="de-DE" dirty="0"/>
               <a:t>aus. </a:t>
             </a:r>
-            <a:r>
-              <a:rPr lang="de-DE" altLang="de-DE" dirty="0" err="1"/>
-              <a:t>Git</a:t>
-            </a:r>
-            <a:r>
-              <a:rPr lang="de-DE" altLang="de-DE" dirty="0"/>
-              <a:t> sollte Ihnen anzeigen, dass </a:t>
-            </a:r>
-            <a:r>
-              <a:rPr lang="de-DE" altLang="de-DE" dirty="0">
-                <a:solidFill>
-                  <a:srgbClr val="C00000"/>
-                </a:solidFill>
-              </a:rPr>
-              <a:t>new_file.txt </a:t>
-            </a:r>
-            <a:r>
-              <a:rPr lang="de-DE" altLang="de-DE" dirty="0"/>
-              <a:t>gelöscht wurde und </a:t>
-            </a:r>
-            <a:r>
-              <a:rPr lang="de-DE" altLang="de-DE" dirty="0">
-                <a:solidFill>
-                  <a:srgbClr val="C00000"/>
-                </a:solidFill>
-              </a:rPr>
-              <a:t>file2.txt </a:t>
-            </a:r>
-            <a:r>
-              <a:rPr lang="de-DE" altLang="de-DE" dirty="0"/>
-              <a:t>als </a:t>
-            </a:r>
-            <a:r>
-              <a:rPr lang="de-DE" altLang="de-DE" dirty="0" err="1"/>
-              <a:t>untracked</a:t>
-            </a:r>
-            <a:r>
-              <a:rPr lang="de-DE" altLang="de-DE" dirty="0"/>
-              <a:t> </a:t>
-            </a:r>
-            <a:r>
-              <a:rPr lang="de-DE" altLang="de-DE" dirty="0" err="1"/>
-              <a:t>file</a:t>
-            </a:r>
-            <a:r>
-              <a:rPr lang="de-DE" altLang="de-DE" dirty="0"/>
-              <a:t> zum Repository hinzugefügt wurde, was nicht direkt unsere Änderungen widerspiegelt.</a:t>
-            </a:r>
           </a:p>
           <a:p>
             <a:pPr marL="457200" indent="-457200">
@@ -21997,62 +22087,45 @@
             </a:r>
             <a:r>
               <a:rPr lang="de-DE" altLang="de-DE" dirty="0"/>
+              <a:t>aus..</a:t>
+            </a:r>
+          </a:p>
+          <a:p>
+            <a:pPr marL="457200" indent="-457200">
+              <a:buFont typeface="+mj-lt"/>
+              <a:buAutoNum type="arabicPeriod"/>
+            </a:pPr>
+            <a:r>
+              <a:rPr lang="de-DE" altLang="de-DE" dirty="0"/>
+              <a:t>Führen Sie den Befehl </a:t>
+            </a:r>
+            <a:r>
+              <a:rPr lang="de-DE" altLang="de-DE" dirty="0" err="1">
+                <a:latin typeface="Consolas" panose="020B0609020204030204" pitchFamily="49" charset="0"/>
+              </a:rPr>
+              <a:t>git</a:t>
+            </a:r>
+            <a:r>
+              <a:rPr lang="de-DE" altLang="de-DE" dirty="0">
+                <a:latin typeface="Consolas" panose="020B0609020204030204" pitchFamily="49" charset="0"/>
+              </a:rPr>
+              <a:t> </a:t>
+            </a:r>
+            <a:r>
+              <a:rPr lang="de-DE" altLang="de-DE" dirty="0" err="1">
+                <a:latin typeface="Consolas" panose="020B0609020204030204" pitchFamily="49" charset="0"/>
+              </a:rPr>
+              <a:t>status</a:t>
+            </a:r>
+            <a:r>
+              <a:rPr lang="de-DE" altLang="de-DE" dirty="0">
+                <a:latin typeface="Consolas" panose="020B0609020204030204" pitchFamily="49" charset="0"/>
+              </a:rPr>
+              <a:t> erneut </a:t>
+            </a:r>
+            <a:r>
+              <a:rPr lang="de-DE" altLang="de-DE" dirty="0"/>
               <a:t>aus.</a:t>
-            </a:r>
-            <a:br>
-              <a:rPr lang="de-DE" altLang="de-DE" dirty="0"/>
-            </a:br>
-            <a:r>
-              <a:rPr lang="de-DE" altLang="de-DE" dirty="0" err="1">
-                <a:latin typeface="Consolas" panose="020B0609020204030204" pitchFamily="49" charset="0"/>
-              </a:rPr>
-              <a:t>git</a:t>
-            </a:r>
-            <a:r>
-              <a:rPr lang="de-DE" altLang="de-DE" dirty="0">
-                <a:latin typeface="Consolas" panose="020B0609020204030204" pitchFamily="49" charset="0"/>
-              </a:rPr>
-              <a:t> </a:t>
-            </a:r>
-            <a:r>
-              <a:rPr lang="de-DE" altLang="de-DE" dirty="0" err="1">
-                <a:latin typeface="Consolas" panose="020B0609020204030204" pitchFamily="49" charset="0"/>
-              </a:rPr>
-              <a:t>status</a:t>
-            </a:r>
-            <a:r>
-              <a:rPr lang="de-DE" altLang="de-DE" dirty="0">
-                <a:latin typeface="Consolas" panose="020B0609020204030204" pitchFamily="49" charset="0"/>
-              </a:rPr>
-              <a:t> </a:t>
-            </a:r>
-            <a:r>
-              <a:rPr lang="de-DE" altLang="de-DE" dirty="0"/>
-              <a:t>sollte Ihnen nun anzeigen, dass </a:t>
-            </a:r>
-            <a:r>
-              <a:rPr lang="de-DE" altLang="de-DE" dirty="0">
-                <a:solidFill>
-                  <a:srgbClr val="C00000"/>
-                </a:solidFill>
-              </a:rPr>
-              <a:t>new_file.txt </a:t>
-            </a:r>
-            <a:r>
-              <a:rPr lang="de-DE" altLang="de-DE" dirty="0"/>
-              <a:t>in </a:t>
-            </a:r>
-            <a:r>
-              <a:rPr lang="de-DE" altLang="de-DE" dirty="0">
-                <a:solidFill>
-                  <a:srgbClr val="C00000"/>
-                </a:solidFill>
-              </a:rPr>
-              <a:t>file2.txt </a:t>
-            </a:r>
-            <a:r>
-              <a:rPr lang="de-DE" altLang="de-DE" dirty="0"/>
-              <a:t>umbenannt wurde. Committen Sie die Änderungen.</a:t>
             </a:r>
           </a:p>
         </p:txBody>
@@ -22161,7 +22234,7 @@
             </a:pPr>
             <a:r>
               <a:rPr lang="de-DE" altLang="de-DE" b="1" dirty="0"/>
-              <a:t>Lösung Übungsaufgabe 4: Umbenennen von Dateien</a:t>
+              <a:t>Lösung Übungsaufgabe 3: Umbenennen von Dateien</a:t>
             </a:r>
           </a:p>
           <a:p>
@@ -22524,7 +22597,7 @@
             </a:pPr>
             <a:r>
               <a:rPr lang="de-DE" altLang="de-DE" b="1" dirty="0"/>
-              <a:t>Lösung Übungsaufgabe 4: Umbenennen von Dateien</a:t>
+              <a:t>Lösung Übungsaufgabe 3: Umbenennen von Dateien</a:t>
             </a:r>
           </a:p>
           <a:p>
@@ -22571,11 +22644,15 @@
                 <a:latin typeface="Consolas" panose="020B0609020204030204" pitchFamily="49" charset="0"/>
               </a:rPr>
             </a:br>
-            <a:br>
-              <a:rPr lang="de-DE" altLang="de-DE" sz="1400" dirty="0">
-                <a:latin typeface="Consolas" panose="020B0609020204030204" pitchFamily="49" charset="0"/>
-              </a:rPr>
-            </a:br>
+            <a:endParaRPr lang="de-DE" altLang="de-DE" sz="1400" dirty="0">
+              <a:latin typeface="Consolas" panose="020B0609020204030204" pitchFamily="49" charset="0"/>
+            </a:endParaRPr>
+          </a:p>
+          <a:p>
+            <a:pPr marL="457200" indent="-457200">
+              <a:buFont typeface="+mj-lt"/>
+              <a:buAutoNum type="arabicPeriod" startAt="4"/>
+            </a:pPr>
             <a:r>
               <a:rPr lang="de-DE" altLang="de-DE" sz="1400" dirty="0">
                 <a:latin typeface="Consolas" panose="020B0609020204030204" pitchFamily="49" charset="0"/>
@@ -23088,7 +23165,7 @@
             </a:pPr>
             <a:r>
               <a:rPr lang="de-DE" altLang="de-DE" b="1" dirty="0"/>
-              <a:t>Übungsaufgabe 5: .</a:t>
+              <a:t>Übungsaufgabe 4: .</a:t>
             </a:r>
             <a:r>
               <a:rPr lang="de-DE" altLang="de-DE" b="1" dirty="0" err="1"/>
@@ -23471,7 +23548,7 @@
             </a:pPr>
             <a:r>
               <a:rPr lang="de-DE" altLang="de-DE" b="1" dirty="0"/>
-              <a:t>Übungsaufgabe 5: .</a:t>
+              <a:t>Übungsaufgabe 4: .</a:t>
             </a:r>
             <a:r>
               <a:rPr lang="de-DE" altLang="de-DE" b="1" dirty="0" err="1"/>
@@ -23900,7 +23977,7 @@
             </a:pPr>
             <a:r>
               <a:rPr lang="de-DE" altLang="de-DE" b="1" dirty="0"/>
-              <a:t>Lösung Übungsaufgabe 5: .</a:t>
+              <a:t>Lösung Übungsaufgabe 4: .</a:t>
             </a:r>
             <a:r>
               <a:rPr lang="de-DE" altLang="de-DE" b="1" dirty="0" err="1"/>
@@ -24394,7 +24471,7 @@
             </a:pPr>
             <a:r>
               <a:rPr lang="de-DE" altLang="de-DE" b="1" dirty="0"/>
-              <a:t>Lösung Übungsaufgabe 5: .</a:t>
+              <a:t>Lösung Übungsaufgabe 4: .</a:t>
             </a:r>
             <a:r>
               <a:rPr lang="de-DE" altLang="de-DE" b="1" dirty="0" err="1"/>
@@ -31459,7 +31536,7 @@
           <a:p>
             <a:r>
               <a:rPr lang="de-DE" altLang="de-DE" dirty="0"/>
-              <a:t>Häufiger Use Case: Verwaltung von Quellcode</a:t>
+              <a:t>Beispiel: Quellcode</a:t>
             </a:r>
           </a:p>
           <a:p>
@@ -34075,7 +34152,7 @@
             </a:pPr>
             <a:r>
               <a:rPr lang="de-DE" altLang="de-DE" b="1" dirty="0"/>
-              <a:t>Übungsaufgabe 6: </a:t>
+              <a:t>Übungsaufgabe 5: </a:t>
             </a:r>
             <a:r>
               <a:rPr lang="de-DE" altLang="de-DE" b="1" dirty="0" err="1"/>
@@ -34346,7 +34423,7 @@
             </a:pPr>
             <a:r>
               <a:rPr lang="de-DE" altLang="de-DE" b="1" dirty="0"/>
-              <a:t>Lösung Übungsaufgabe 6: </a:t>
+              <a:t>Lösung Übungsaufgabe 5: </a:t>
             </a:r>
             <a:r>
               <a:rPr lang="de-DE" altLang="de-DE" b="1" dirty="0" err="1"/>
@@ -34699,7 +34776,7 @@
             </a:pPr>
             <a:r>
               <a:rPr lang="de-DE" altLang="de-DE" b="1" dirty="0"/>
-              <a:t>Lösung Übungsaufgabe 6: </a:t>
+              <a:t>Lösung Übungsaufgabe 5: </a:t>
             </a:r>
             <a:r>
               <a:rPr lang="de-DE" altLang="de-DE" b="1" dirty="0" err="1"/>
@@ -35004,7 +35081,7 @@
             </a:pPr>
             <a:r>
               <a:rPr lang="de-DE" altLang="de-DE" b="1" dirty="0"/>
-              <a:t>Übungsaufgabe 7: </a:t>
+              <a:t>Übungsaufgabe 6: </a:t>
             </a:r>
             <a:r>
               <a:rPr lang="de-DE" altLang="de-DE" b="1" dirty="0" err="1"/>
@@ -35272,7 +35349,7 @@
             </a:pPr>
             <a:r>
               <a:rPr lang="de-DE" altLang="de-DE" b="1" dirty="0"/>
-              <a:t>Lösung Übungsaufgabe 7: </a:t>
+              <a:t>Lösung Übungsaufgabe 6: </a:t>
             </a:r>
             <a:r>
               <a:rPr lang="de-DE" altLang="de-DE" b="1" dirty="0" err="1"/>

</xml_diff>

<commit_message>
Formfehler in 1-2 und 1-3 korrigiert sowie Aufgabe 9+10 dort gekürzt
</commit_message>
<xml_diff>
--- a/slides/Tag-1_2-Git.pptx
+++ b/slides/Tag-1_2-Git.pptx
@@ -2834,7 +2834,7 @@
               <a:pPr algn="ctr">
                 <a:defRPr/>
               </a:pPr>
-              <a:t>25.07.2024</a:t>
+              <a:t>26.08.2024</a:t>
             </a:fld>
             <a:endParaRPr lang="de-DE" sz="1000" dirty="0">
               <a:solidFill>
@@ -5004,7 +5004,7 @@
               <a:pPr algn="ctr">
                 <a:defRPr/>
               </a:pPr>
-              <a:t>25.07.2024</a:t>
+              <a:t>26.08.2024</a:t>
             </a:fld>
             <a:endParaRPr lang="de-DE" sz="1000" dirty="0">
               <a:solidFill>
@@ -6439,7 +6439,7 @@
               <a:pPr algn="ctr">
                 <a:defRPr/>
               </a:pPr>
-              <a:t>25.07.2024</a:t>
+              <a:t>26.08.2024</a:t>
             </a:fld>
             <a:endParaRPr lang="de-DE" sz="1000">
               <a:solidFill>
@@ -22087,7 +22087,7 @@
             </a:r>
             <a:r>
               <a:rPr lang="de-DE" altLang="de-DE" dirty="0"/>
-              <a:t>aus..</a:t>
+              <a:t>aus.</a:t>
             </a:r>
           </a:p>
           <a:p>
@@ -34257,7 +34257,7 @@
             </a:r>
             <a:r>
               <a:rPr lang="de-DE" altLang="de-DE" dirty="0"/>
-              <a:t>im Ordner an und committen Sie auch diese.</a:t>
+              <a:t>im Ordner und committen Sie auch diese.</a:t>
             </a:r>
           </a:p>
           <a:p>
@@ -35800,7 +35800,7 @@
             </a:pPr>
             <a:r>
               <a:rPr lang="de-DE" altLang="de-DE" b="1" dirty="0"/>
-              <a:t>Lösung Übungsaufgabe 7: </a:t>
+              <a:t>Lösung Übungsaufgabe 6: </a:t>
             </a:r>
             <a:r>
               <a:rPr lang="de-DE" altLang="de-DE" b="1" dirty="0" err="1"/>

</xml_diff>